<commit_message>
Commit after update to intro and MOM, also added planning timeline
</commit_message>
<xml_diff>
--- a/Draft design.pptx
+++ b/Draft design.pptx
@@ -5,7 +5,7 @@
     <p:sldMasterId id="2147483648" r:id="rId1"/>
   </p:sldMasterIdLst>
   <p:notesMasterIdLst>
-    <p:notesMasterId r:id="rId8"/>
+    <p:notesMasterId r:id="rId9"/>
   </p:notesMasterIdLst>
   <p:sldIdLst>
     <p:sldId id="256" r:id="rId2"/>
@@ -14,6 +14,7 @@
     <p:sldId id="260" r:id="rId5"/>
     <p:sldId id="261" r:id="rId6"/>
     <p:sldId id="257" r:id="rId7"/>
+    <p:sldId id="262" r:id="rId8"/>
   </p:sldIdLst>
   <p:sldSz cx="12192000" cy="6858000"/>
   <p:notesSz cx="6858000" cy="9144000"/>
@@ -202,7 +203,7 @@
           <a:p>
             <a:fld id="{2CA4F280-2C91-4EC9-847D-FD28A4318486}" type="datetimeFigureOut">
               <a:rPr lang="en-US" smtClean="0"/>
-              <a:t>2/1/2023</a:t>
+              <a:t>2/11/2023</a:t>
             </a:fld>
             <a:endParaRPr lang="en-US"/>
           </a:p>
@@ -898,6 +899,90 @@
 </p:notes>
 </file>
 
+<file path=ppt/notesSlides/notesSlide6.xml><?xml version="1.0" encoding="utf-8"?>
+<p:notes xmlns:a="http://schemas.openxmlformats.org/drawingml/2006/main" xmlns:r="http://schemas.openxmlformats.org/officeDocument/2006/relationships" xmlns:p="http://schemas.openxmlformats.org/presentationml/2006/main">
+  <p:cSld>
+    <p:spTree>
+      <p:nvGrpSpPr>
+        <p:cNvPr id="1" name=""/>
+        <p:cNvGrpSpPr/>
+        <p:nvPr/>
+      </p:nvGrpSpPr>
+      <p:grpSpPr>
+        <a:xfrm>
+          <a:off x="0" y="0"/>
+          <a:ext cx="0" cy="0"/>
+          <a:chOff x="0" y="0"/>
+          <a:chExt cx="0" cy="0"/>
+        </a:xfrm>
+      </p:grpSpPr>
+      <p:sp>
+        <p:nvSpPr>
+          <p:cNvPr id="2" name="Slide Image Placeholder 1"/>
+          <p:cNvSpPr>
+            <a:spLocks noGrp="1" noRot="1" noChangeAspect="1"/>
+          </p:cNvSpPr>
+          <p:nvPr>
+            <p:ph type="sldImg"/>
+          </p:nvPr>
+        </p:nvSpPr>
+        <p:spPr/>
+      </p:sp>
+      <p:sp>
+        <p:nvSpPr>
+          <p:cNvPr id="3" name="Notes Placeholder 2"/>
+          <p:cNvSpPr>
+            <a:spLocks noGrp="1"/>
+          </p:cNvSpPr>
+          <p:nvPr>
+            <p:ph type="body" idx="1"/>
+          </p:nvPr>
+        </p:nvSpPr>
+        <p:spPr/>
+        <p:txBody>
+          <a:bodyPr/>
+          <a:lstStyle/>
+          <a:p>
+            <a:endParaRPr lang="en-SG" dirty="0"/>
+          </a:p>
+        </p:txBody>
+      </p:sp>
+      <p:sp>
+        <p:nvSpPr>
+          <p:cNvPr id="4" name="Slide Number Placeholder 3"/>
+          <p:cNvSpPr>
+            <a:spLocks noGrp="1"/>
+          </p:cNvSpPr>
+          <p:nvPr>
+            <p:ph type="sldNum" sz="quarter" idx="5"/>
+          </p:nvPr>
+        </p:nvSpPr>
+        <p:spPr/>
+        <p:txBody>
+          <a:bodyPr/>
+          <a:lstStyle/>
+          <a:p>
+            <a:fld id="{04779685-DD1D-4B3A-80C7-29224071D3B0}" type="slidenum">
+              <a:rPr lang="en-US" smtClean="0"/>
+              <a:t>7</a:t>
+            </a:fld>
+            <a:endParaRPr lang="en-US"/>
+          </a:p>
+        </p:txBody>
+      </p:sp>
+    </p:spTree>
+    <p:extLst>
+      <p:ext uri="{BB962C8B-B14F-4D97-AF65-F5344CB8AC3E}">
+        <p14:creationId xmlns:p14="http://schemas.microsoft.com/office/powerpoint/2010/main" val="679543376"/>
+      </p:ext>
+    </p:extLst>
+  </p:cSld>
+  <p:clrMapOvr>
+    <a:masterClrMapping/>
+  </p:clrMapOvr>
+</p:notes>
+</file>
+
 <file path=ppt/slideLayouts/slideLayout1.xml><?xml version="1.0" encoding="utf-8"?>
 <p:sldLayout xmlns:a="http://schemas.openxmlformats.org/drawingml/2006/main" xmlns:r="http://schemas.openxmlformats.org/officeDocument/2006/relationships" xmlns:p="http://schemas.openxmlformats.org/presentationml/2006/main" type="title" preserve="1">
   <p:cSld name="Title Slide">
@@ -1045,7 +1130,7 @@
           <a:p>
             <a:fld id="{C83E805E-66AE-4367-AE4D-B25E87DFFBBE}" type="datetimeFigureOut">
               <a:rPr lang="en-US" smtClean="0"/>
-              <a:t>2/1/2023</a:t>
+              <a:t>2/11/2023</a:t>
             </a:fld>
             <a:endParaRPr lang="en-US"/>
           </a:p>
@@ -1243,7 +1328,7 @@
           <a:p>
             <a:fld id="{C83E805E-66AE-4367-AE4D-B25E87DFFBBE}" type="datetimeFigureOut">
               <a:rPr lang="en-US" smtClean="0"/>
-              <a:t>2/1/2023</a:t>
+              <a:t>2/11/2023</a:t>
             </a:fld>
             <a:endParaRPr lang="en-US"/>
           </a:p>
@@ -1451,7 +1536,7 @@
           <a:p>
             <a:fld id="{C83E805E-66AE-4367-AE4D-B25E87DFFBBE}" type="datetimeFigureOut">
               <a:rPr lang="en-US" smtClean="0"/>
-              <a:t>2/1/2023</a:t>
+              <a:t>2/11/2023</a:t>
             </a:fld>
             <a:endParaRPr lang="en-US"/>
           </a:p>
@@ -1649,7 +1734,7 @@
           <a:p>
             <a:fld id="{C83E805E-66AE-4367-AE4D-B25E87DFFBBE}" type="datetimeFigureOut">
               <a:rPr lang="en-US" smtClean="0"/>
-              <a:t>2/1/2023</a:t>
+              <a:t>2/11/2023</a:t>
             </a:fld>
             <a:endParaRPr lang="en-US"/>
           </a:p>
@@ -1924,7 +2009,7 @@
           <a:p>
             <a:fld id="{C83E805E-66AE-4367-AE4D-B25E87DFFBBE}" type="datetimeFigureOut">
               <a:rPr lang="en-US" smtClean="0"/>
-              <a:t>2/1/2023</a:t>
+              <a:t>2/11/2023</a:t>
             </a:fld>
             <a:endParaRPr lang="en-US"/>
           </a:p>
@@ -2189,7 +2274,7 @@
           <a:p>
             <a:fld id="{C83E805E-66AE-4367-AE4D-B25E87DFFBBE}" type="datetimeFigureOut">
               <a:rPr lang="en-US" smtClean="0"/>
-              <a:t>2/1/2023</a:t>
+              <a:t>2/11/2023</a:t>
             </a:fld>
             <a:endParaRPr lang="en-US"/>
           </a:p>
@@ -2601,7 +2686,7 @@
           <a:p>
             <a:fld id="{C83E805E-66AE-4367-AE4D-B25E87DFFBBE}" type="datetimeFigureOut">
               <a:rPr lang="en-US" smtClean="0"/>
-              <a:t>2/1/2023</a:t>
+              <a:t>2/11/2023</a:t>
             </a:fld>
             <a:endParaRPr lang="en-US"/>
           </a:p>
@@ -2742,7 +2827,7 @@
           <a:p>
             <a:fld id="{C83E805E-66AE-4367-AE4D-B25E87DFFBBE}" type="datetimeFigureOut">
               <a:rPr lang="en-US" smtClean="0"/>
-              <a:t>2/1/2023</a:t>
+              <a:t>2/11/2023</a:t>
             </a:fld>
             <a:endParaRPr lang="en-US"/>
           </a:p>
@@ -2855,7 +2940,7 @@
           <a:p>
             <a:fld id="{C83E805E-66AE-4367-AE4D-B25E87DFFBBE}" type="datetimeFigureOut">
               <a:rPr lang="en-US" smtClean="0"/>
-              <a:t>2/1/2023</a:t>
+              <a:t>2/11/2023</a:t>
             </a:fld>
             <a:endParaRPr lang="en-US"/>
           </a:p>
@@ -3166,7 +3251,7 @@
           <a:p>
             <a:fld id="{C83E805E-66AE-4367-AE4D-B25E87DFFBBE}" type="datetimeFigureOut">
               <a:rPr lang="en-US" smtClean="0"/>
-              <a:t>2/1/2023</a:t>
+              <a:t>2/11/2023</a:t>
             </a:fld>
             <a:endParaRPr lang="en-US"/>
           </a:p>
@@ -3454,7 +3539,7 @@
           <a:p>
             <a:fld id="{C83E805E-66AE-4367-AE4D-B25E87DFFBBE}" type="datetimeFigureOut">
               <a:rPr lang="en-US" smtClean="0"/>
-              <a:t>2/1/2023</a:t>
+              <a:t>2/11/2023</a:t>
             </a:fld>
             <a:endParaRPr lang="en-US"/>
           </a:p>
@@ -3695,7 +3780,7 @@
           <a:p>
             <a:fld id="{C83E805E-66AE-4367-AE4D-B25E87DFFBBE}" type="datetimeFigureOut">
               <a:rPr lang="en-US" smtClean="0"/>
-              <a:t>2/1/2023</a:t>
+              <a:t>2/11/2023</a:t>
             </a:fld>
             <a:endParaRPr lang="en-US"/>
           </a:p>
@@ -11279,6 +11364,2717 @@
     <p:extLst>
       <p:ext uri="{BB962C8B-B14F-4D97-AF65-F5344CB8AC3E}">
         <p14:creationId xmlns:p14="http://schemas.microsoft.com/office/powerpoint/2010/main" val="2489438154"/>
+      </p:ext>
+    </p:extLst>
+  </p:cSld>
+  <p:clrMapOvr>
+    <a:masterClrMapping/>
+  </p:clrMapOvr>
+</p:sld>
+</file>
+
+<file path=ppt/slides/slide7.xml><?xml version="1.0" encoding="utf-8"?>
+<p:sld xmlns:a="http://schemas.openxmlformats.org/drawingml/2006/main" xmlns:r="http://schemas.openxmlformats.org/officeDocument/2006/relationships" xmlns:p="http://schemas.openxmlformats.org/presentationml/2006/main">
+  <p:cSld>
+    <p:spTree>
+      <p:nvGrpSpPr>
+        <p:cNvPr id="1" name=""/>
+        <p:cNvGrpSpPr/>
+        <p:nvPr/>
+      </p:nvGrpSpPr>
+      <p:grpSpPr>
+        <a:xfrm>
+          <a:off x="0" y="0"/>
+          <a:ext cx="0" cy="0"/>
+          <a:chOff x="0" y="0"/>
+          <a:chExt cx="0" cy="0"/>
+        </a:xfrm>
+      </p:grpSpPr>
+      <p:sp>
+        <p:nvSpPr>
+          <p:cNvPr id="51" name="Rectangle 50">
+            <a:extLst>
+              <a:ext uri="{FF2B5EF4-FFF2-40B4-BE49-F238E27FC236}">
+                <a16:creationId xmlns:a16="http://schemas.microsoft.com/office/drawing/2014/main" id="{0985A9B6-FCFB-B56C-A93C-F09DD9274A8F}"/>
+              </a:ext>
+            </a:extLst>
+          </p:cNvPr>
+          <p:cNvSpPr/>
+          <p:nvPr/>
+        </p:nvSpPr>
+        <p:spPr>
+          <a:xfrm>
+            <a:off x="4219302" y="3347826"/>
+            <a:ext cx="1164132" cy="45719"/>
+          </a:xfrm>
+          <a:prstGeom prst="rect">
+            <a:avLst/>
+          </a:prstGeom>
+          <a:solidFill>
+            <a:schemeClr val="accent1">
+              <a:lumMod val="40000"/>
+              <a:lumOff val="60000"/>
+            </a:schemeClr>
+          </a:solidFill>
+          <a:ln>
+            <a:noFill/>
+          </a:ln>
+        </p:spPr>
+        <p:style>
+          <a:lnRef idx="2">
+            <a:schemeClr val="accent1">
+              <a:shade val="50000"/>
+            </a:schemeClr>
+          </a:lnRef>
+          <a:fillRef idx="1">
+            <a:schemeClr val="accent1"/>
+          </a:fillRef>
+          <a:effectRef idx="0">
+            <a:schemeClr val="accent1"/>
+          </a:effectRef>
+          <a:fontRef idx="minor">
+            <a:schemeClr val="lt1"/>
+          </a:fontRef>
+        </p:style>
+        <p:txBody>
+          <a:bodyPr rtlCol="0" anchor="ctr"/>
+          <a:lstStyle/>
+          <a:p>
+            <a:pPr algn="ctr"/>
+            <a:endParaRPr lang="en-SG"/>
+          </a:p>
+        </p:txBody>
+      </p:sp>
+      <p:sp>
+        <p:nvSpPr>
+          <p:cNvPr id="2" name="Title 1">
+            <a:extLst>
+              <a:ext uri="{FF2B5EF4-FFF2-40B4-BE49-F238E27FC236}">
+                <a16:creationId xmlns:a16="http://schemas.microsoft.com/office/drawing/2014/main" id="{C0BC821B-1332-A4A5-A20D-D2BE2CF4EDFB}"/>
+              </a:ext>
+            </a:extLst>
+          </p:cNvPr>
+          <p:cNvSpPr>
+            <a:spLocks noGrp="1"/>
+          </p:cNvSpPr>
+          <p:nvPr>
+            <p:ph type="title"/>
+          </p:nvPr>
+        </p:nvSpPr>
+        <p:spPr/>
+        <p:txBody>
+          <a:bodyPr/>
+          <a:lstStyle/>
+          <a:p>
+            <a:r>
+              <a:rPr lang="en-SG" dirty="0"/>
+              <a:t>Project Timeline</a:t>
+            </a:r>
+          </a:p>
+        </p:txBody>
+      </p:sp>
+      <p:sp>
+        <p:nvSpPr>
+          <p:cNvPr id="4" name="Rectangle 3">
+            <a:extLst>
+              <a:ext uri="{FF2B5EF4-FFF2-40B4-BE49-F238E27FC236}">
+                <a16:creationId xmlns:a16="http://schemas.microsoft.com/office/drawing/2014/main" id="{0F1E16A8-0523-3C16-B32A-C2A3AE6DB374}"/>
+              </a:ext>
+            </a:extLst>
+          </p:cNvPr>
+          <p:cNvSpPr/>
+          <p:nvPr/>
+        </p:nvSpPr>
+        <p:spPr>
+          <a:xfrm>
+            <a:off x="2530373" y="4061912"/>
+            <a:ext cx="6696591" cy="45719"/>
+          </a:xfrm>
+          <a:prstGeom prst="rect">
+            <a:avLst/>
+          </a:prstGeom>
+          <a:solidFill>
+            <a:schemeClr val="bg2">
+              <a:lumMod val="90000"/>
+            </a:schemeClr>
+          </a:solidFill>
+          <a:ln>
+            <a:noFill/>
+          </a:ln>
+        </p:spPr>
+        <p:style>
+          <a:lnRef idx="2">
+            <a:schemeClr val="accent1">
+              <a:shade val="50000"/>
+            </a:schemeClr>
+          </a:lnRef>
+          <a:fillRef idx="1">
+            <a:schemeClr val="accent1"/>
+          </a:fillRef>
+          <a:effectRef idx="0">
+            <a:schemeClr val="accent1"/>
+          </a:effectRef>
+          <a:fontRef idx="minor">
+            <a:schemeClr val="lt1"/>
+          </a:fontRef>
+        </p:style>
+        <p:txBody>
+          <a:bodyPr rtlCol="0" anchor="ctr"/>
+          <a:lstStyle/>
+          <a:p>
+            <a:pPr algn="ctr"/>
+            <a:endParaRPr lang="en-SG"/>
+          </a:p>
+        </p:txBody>
+      </p:sp>
+      <p:sp>
+        <p:nvSpPr>
+          <p:cNvPr id="5" name="Rectangle 4">
+            <a:extLst>
+              <a:ext uri="{FF2B5EF4-FFF2-40B4-BE49-F238E27FC236}">
+                <a16:creationId xmlns:a16="http://schemas.microsoft.com/office/drawing/2014/main" id="{65F89264-311B-C1F2-661D-2F82807BC5AF}"/>
+              </a:ext>
+            </a:extLst>
+          </p:cNvPr>
+          <p:cNvSpPr/>
+          <p:nvPr/>
+        </p:nvSpPr>
+        <p:spPr>
+          <a:xfrm>
+            <a:off x="2530373" y="4026514"/>
+            <a:ext cx="81116" cy="116513"/>
+          </a:xfrm>
+          <a:prstGeom prst="rect">
+            <a:avLst/>
+          </a:prstGeom>
+          <a:solidFill>
+            <a:schemeClr val="tx1">
+              <a:lumMod val="50000"/>
+              <a:lumOff val="50000"/>
+            </a:schemeClr>
+          </a:solidFill>
+          <a:ln>
+            <a:noFill/>
+          </a:ln>
+        </p:spPr>
+        <p:style>
+          <a:lnRef idx="2">
+            <a:schemeClr val="accent1">
+              <a:shade val="50000"/>
+            </a:schemeClr>
+          </a:lnRef>
+          <a:fillRef idx="1">
+            <a:schemeClr val="accent1"/>
+          </a:fillRef>
+          <a:effectRef idx="0">
+            <a:schemeClr val="accent1"/>
+          </a:effectRef>
+          <a:fontRef idx="minor">
+            <a:schemeClr val="lt1"/>
+          </a:fontRef>
+        </p:style>
+        <p:txBody>
+          <a:bodyPr rtlCol="0" anchor="ctr"/>
+          <a:lstStyle/>
+          <a:p>
+            <a:pPr algn="ctr"/>
+            <a:endParaRPr lang="en-SG"/>
+          </a:p>
+        </p:txBody>
+      </p:sp>
+      <p:sp>
+        <p:nvSpPr>
+          <p:cNvPr id="6" name="Rectangle 5">
+            <a:extLst>
+              <a:ext uri="{FF2B5EF4-FFF2-40B4-BE49-F238E27FC236}">
+                <a16:creationId xmlns:a16="http://schemas.microsoft.com/office/drawing/2014/main" id="{07D52632-1988-39B2-5336-0509755A3B95}"/>
+              </a:ext>
+            </a:extLst>
+          </p:cNvPr>
+          <p:cNvSpPr/>
+          <p:nvPr/>
+        </p:nvSpPr>
+        <p:spPr>
+          <a:xfrm>
+            <a:off x="3647973" y="4026514"/>
+            <a:ext cx="81116" cy="116513"/>
+          </a:xfrm>
+          <a:prstGeom prst="rect">
+            <a:avLst/>
+          </a:prstGeom>
+          <a:solidFill>
+            <a:schemeClr val="tx1">
+              <a:lumMod val="50000"/>
+              <a:lumOff val="50000"/>
+            </a:schemeClr>
+          </a:solidFill>
+          <a:ln>
+            <a:noFill/>
+          </a:ln>
+        </p:spPr>
+        <p:style>
+          <a:lnRef idx="2">
+            <a:schemeClr val="accent1">
+              <a:shade val="50000"/>
+            </a:schemeClr>
+          </a:lnRef>
+          <a:fillRef idx="1">
+            <a:schemeClr val="accent1"/>
+          </a:fillRef>
+          <a:effectRef idx="0">
+            <a:schemeClr val="accent1"/>
+          </a:effectRef>
+          <a:fontRef idx="minor">
+            <a:schemeClr val="lt1"/>
+          </a:fontRef>
+        </p:style>
+        <p:txBody>
+          <a:bodyPr rtlCol="0" anchor="ctr"/>
+          <a:lstStyle/>
+          <a:p>
+            <a:pPr algn="ctr"/>
+            <a:endParaRPr lang="en-SG"/>
+          </a:p>
+        </p:txBody>
+      </p:sp>
+      <p:sp>
+        <p:nvSpPr>
+          <p:cNvPr id="8" name="Rectangle 7">
+            <a:extLst>
+              <a:ext uri="{FF2B5EF4-FFF2-40B4-BE49-F238E27FC236}">
+                <a16:creationId xmlns:a16="http://schemas.microsoft.com/office/drawing/2014/main" id="{D5DD3318-52D7-1B38-9EA5-295D443D02DA}"/>
+              </a:ext>
+            </a:extLst>
+          </p:cNvPr>
+          <p:cNvSpPr/>
+          <p:nvPr/>
+        </p:nvSpPr>
+        <p:spPr>
+          <a:xfrm>
+            <a:off x="4764754" y="4026514"/>
+            <a:ext cx="81116" cy="116513"/>
+          </a:xfrm>
+          <a:prstGeom prst="rect">
+            <a:avLst/>
+          </a:prstGeom>
+          <a:solidFill>
+            <a:schemeClr val="tx1">
+              <a:lumMod val="50000"/>
+              <a:lumOff val="50000"/>
+            </a:schemeClr>
+          </a:solidFill>
+          <a:ln>
+            <a:noFill/>
+          </a:ln>
+        </p:spPr>
+        <p:style>
+          <a:lnRef idx="2">
+            <a:schemeClr val="accent1">
+              <a:shade val="50000"/>
+            </a:schemeClr>
+          </a:lnRef>
+          <a:fillRef idx="1">
+            <a:schemeClr val="accent1"/>
+          </a:fillRef>
+          <a:effectRef idx="0">
+            <a:schemeClr val="accent1"/>
+          </a:effectRef>
+          <a:fontRef idx="minor">
+            <a:schemeClr val="lt1"/>
+          </a:fontRef>
+        </p:style>
+        <p:txBody>
+          <a:bodyPr rtlCol="0" anchor="ctr"/>
+          <a:lstStyle/>
+          <a:p>
+            <a:pPr algn="ctr"/>
+            <a:endParaRPr lang="en-SG"/>
+          </a:p>
+        </p:txBody>
+      </p:sp>
+      <p:sp>
+        <p:nvSpPr>
+          <p:cNvPr id="9" name="Rectangle 8">
+            <a:extLst>
+              <a:ext uri="{FF2B5EF4-FFF2-40B4-BE49-F238E27FC236}">
+                <a16:creationId xmlns:a16="http://schemas.microsoft.com/office/drawing/2014/main" id="{A9A42D8C-BB89-E079-F7D3-4A160EC15304}"/>
+              </a:ext>
+            </a:extLst>
+          </p:cNvPr>
+          <p:cNvSpPr/>
+          <p:nvPr/>
+        </p:nvSpPr>
+        <p:spPr>
+          <a:xfrm>
+            <a:off x="5879897" y="4026513"/>
+            <a:ext cx="81116" cy="116513"/>
+          </a:xfrm>
+          <a:prstGeom prst="rect">
+            <a:avLst/>
+          </a:prstGeom>
+          <a:solidFill>
+            <a:schemeClr val="tx1">
+              <a:lumMod val="50000"/>
+              <a:lumOff val="50000"/>
+            </a:schemeClr>
+          </a:solidFill>
+          <a:ln>
+            <a:noFill/>
+          </a:ln>
+        </p:spPr>
+        <p:style>
+          <a:lnRef idx="2">
+            <a:schemeClr val="accent1">
+              <a:shade val="50000"/>
+            </a:schemeClr>
+          </a:lnRef>
+          <a:fillRef idx="1">
+            <a:schemeClr val="accent1"/>
+          </a:fillRef>
+          <a:effectRef idx="0">
+            <a:schemeClr val="accent1"/>
+          </a:effectRef>
+          <a:fontRef idx="minor">
+            <a:schemeClr val="lt1"/>
+          </a:fontRef>
+        </p:style>
+        <p:txBody>
+          <a:bodyPr rtlCol="0" anchor="ctr"/>
+          <a:lstStyle/>
+          <a:p>
+            <a:pPr algn="ctr"/>
+            <a:endParaRPr lang="en-SG"/>
+          </a:p>
+        </p:txBody>
+      </p:sp>
+      <p:sp>
+        <p:nvSpPr>
+          <p:cNvPr id="10" name="Rectangle 9">
+            <a:extLst>
+              <a:ext uri="{FF2B5EF4-FFF2-40B4-BE49-F238E27FC236}">
+                <a16:creationId xmlns:a16="http://schemas.microsoft.com/office/drawing/2014/main" id="{3BB3A270-0949-D1D6-6FA5-0EEE3E0B3B48}"/>
+              </a:ext>
+            </a:extLst>
+          </p:cNvPr>
+          <p:cNvSpPr/>
+          <p:nvPr/>
+        </p:nvSpPr>
+        <p:spPr>
+          <a:xfrm>
+            <a:off x="6995040" y="4026514"/>
+            <a:ext cx="81116" cy="116513"/>
+          </a:xfrm>
+          <a:prstGeom prst="rect">
+            <a:avLst/>
+          </a:prstGeom>
+          <a:solidFill>
+            <a:schemeClr val="tx1">
+              <a:lumMod val="50000"/>
+              <a:lumOff val="50000"/>
+            </a:schemeClr>
+          </a:solidFill>
+          <a:ln>
+            <a:noFill/>
+          </a:ln>
+        </p:spPr>
+        <p:style>
+          <a:lnRef idx="2">
+            <a:schemeClr val="accent1">
+              <a:shade val="50000"/>
+            </a:schemeClr>
+          </a:lnRef>
+          <a:fillRef idx="1">
+            <a:schemeClr val="accent1"/>
+          </a:fillRef>
+          <a:effectRef idx="0">
+            <a:schemeClr val="accent1"/>
+          </a:effectRef>
+          <a:fontRef idx="minor">
+            <a:schemeClr val="lt1"/>
+          </a:fontRef>
+        </p:style>
+        <p:txBody>
+          <a:bodyPr rtlCol="0" anchor="ctr"/>
+          <a:lstStyle/>
+          <a:p>
+            <a:pPr algn="ctr"/>
+            <a:endParaRPr lang="en-SG"/>
+          </a:p>
+        </p:txBody>
+      </p:sp>
+      <p:sp>
+        <p:nvSpPr>
+          <p:cNvPr id="11" name="Rectangle 10">
+            <a:extLst>
+              <a:ext uri="{FF2B5EF4-FFF2-40B4-BE49-F238E27FC236}">
+                <a16:creationId xmlns:a16="http://schemas.microsoft.com/office/drawing/2014/main" id="{CDFF31FD-A602-ED28-72DB-393A4B1A07DD}"/>
+              </a:ext>
+            </a:extLst>
+          </p:cNvPr>
+          <p:cNvSpPr/>
+          <p:nvPr/>
+        </p:nvSpPr>
+        <p:spPr>
+          <a:xfrm>
+            <a:off x="8111821" y="4026514"/>
+            <a:ext cx="81116" cy="116513"/>
+          </a:xfrm>
+          <a:prstGeom prst="rect">
+            <a:avLst/>
+          </a:prstGeom>
+          <a:solidFill>
+            <a:schemeClr val="tx1">
+              <a:lumMod val="50000"/>
+              <a:lumOff val="50000"/>
+            </a:schemeClr>
+          </a:solidFill>
+          <a:ln>
+            <a:noFill/>
+          </a:ln>
+        </p:spPr>
+        <p:style>
+          <a:lnRef idx="2">
+            <a:schemeClr val="accent1">
+              <a:shade val="50000"/>
+            </a:schemeClr>
+          </a:lnRef>
+          <a:fillRef idx="1">
+            <a:schemeClr val="accent1"/>
+          </a:fillRef>
+          <a:effectRef idx="0">
+            <a:schemeClr val="accent1"/>
+          </a:effectRef>
+          <a:fontRef idx="minor">
+            <a:schemeClr val="lt1"/>
+          </a:fontRef>
+        </p:style>
+        <p:txBody>
+          <a:bodyPr rtlCol="0" anchor="ctr"/>
+          <a:lstStyle/>
+          <a:p>
+            <a:pPr algn="ctr"/>
+            <a:endParaRPr lang="en-SG"/>
+          </a:p>
+        </p:txBody>
+      </p:sp>
+      <p:sp>
+        <p:nvSpPr>
+          <p:cNvPr id="12" name="Rectangle 11">
+            <a:extLst>
+              <a:ext uri="{FF2B5EF4-FFF2-40B4-BE49-F238E27FC236}">
+                <a16:creationId xmlns:a16="http://schemas.microsoft.com/office/drawing/2014/main" id="{ABA57452-918C-AA76-0B6E-6D734DC3595B}"/>
+              </a:ext>
+            </a:extLst>
+          </p:cNvPr>
+          <p:cNvSpPr/>
+          <p:nvPr/>
+        </p:nvSpPr>
+        <p:spPr>
+          <a:xfrm>
+            <a:off x="9226964" y="4026513"/>
+            <a:ext cx="81116" cy="116513"/>
+          </a:xfrm>
+          <a:prstGeom prst="rect">
+            <a:avLst/>
+          </a:prstGeom>
+          <a:solidFill>
+            <a:schemeClr val="tx1">
+              <a:lumMod val="50000"/>
+              <a:lumOff val="50000"/>
+            </a:schemeClr>
+          </a:solidFill>
+          <a:ln>
+            <a:noFill/>
+          </a:ln>
+        </p:spPr>
+        <p:style>
+          <a:lnRef idx="2">
+            <a:schemeClr val="accent1">
+              <a:shade val="50000"/>
+            </a:schemeClr>
+          </a:lnRef>
+          <a:fillRef idx="1">
+            <a:schemeClr val="accent1"/>
+          </a:fillRef>
+          <a:effectRef idx="0">
+            <a:schemeClr val="accent1"/>
+          </a:effectRef>
+          <a:fontRef idx="minor">
+            <a:schemeClr val="lt1"/>
+          </a:fontRef>
+        </p:style>
+        <p:txBody>
+          <a:bodyPr rtlCol="0" anchor="ctr"/>
+          <a:lstStyle/>
+          <a:p>
+            <a:pPr algn="ctr"/>
+            <a:endParaRPr lang="en-SG"/>
+          </a:p>
+        </p:txBody>
+      </p:sp>
+      <p:sp>
+        <p:nvSpPr>
+          <p:cNvPr id="16" name="TextBox 15">
+            <a:extLst>
+              <a:ext uri="{FF2B5EF4-FFF2-40B4-BE49-F238E27FC236}">
+                <a16:creationId xmlns:a16="http://schemas.microsoft.com/office/drawing/2014/main" id="{5DD24C68-9614-E293-6237-16B30431074E}"/>
+              </a:ext>
+            </a:extLst>
+          </p:cNvPr>
+          <p:cNvSpPr txBox="1"/>
+          <p:nvPr/>
+        </p:nvSpPr>
+        <p:spPr>
+          <a:xfrm rot="19730451">
+            <a:off x="3025775" y="4264452"/>
+            <a:ext cx="996950" cy="276999"/>
+          </a:xfrm>
+          <a:prstGeom prst="rect">
+            <a:avLst/>
+          </a:prstGeom>
+          <a:noFill/>
+        </p:spPr>
+        <p:txBody>
+          <a:bodyPr wrap="square" rtlCol="0">
+            <a:spAutoFit/>
+          </a:bodyPr>
+          <a:lstStyle/>
+          <a:p>
+            <a:r>
+              <a:rPr lang="en-SG" sz="1200" dirty="0"/>
+              <a:t>22 Jan 2023</a:t>
+            </a:r>
+          </a:p>
+        </p:txBody>
+      </p:sp>
+      <p:sp>
+        <p:nvSpPr>
+          <p:cNvPr id="18" name="TextBox 17">
+            <a:extLst>
+              <a:ext uri="{FF2B5EF4-FFF2-40B4-BE49-F238E27FC236}">
+                <a16:creationId xmlns:a16="http://schemas.microsoft.com/office/drawing/2014/main" id="{D7BC2AF8-34EB-C7DC-0289-F240CCC6DB99}"/>
+              </a:ext>
+            </a:extLst>
+          </p:cNvPr>
+          <p:cNvSpPr txBox="1"/>
+          <p:nvPr/>
+        </p:nvSpPr>
+        <p:spPr>
+          <a:xfrm rot="19730451">
+            <a:off x="4160527" y="4264451"/>
+            <a:ext cx="996950" cy="276999"/>
+          </a:xfrm>
+          <a:prstGeom prst="rect">
+            <a:avLst/>
+          </a:prstGeom>
+          <a:noFill/>
+        </p:spPr>
+        <p:txBody>
+          <a:bodyPr wrap="square" rtlCol="0">
+            <a:spAutoFit/>
+          </a:bodyPr>
+          <a:lstStyle/>
+          <a:p>
+            <a:r>
+              <a:rPr lang="en-SG" sz="1200" dirty="0"/>
+              <a:t>5 Feb 2023</a:t>
+            </a:r>
+          </a:p>
+        </p:txBody>
+      </p:sp>
+      <p:sp>
+        <p:nvSpPr>
+          <p:cNvPr id="19" name="TextBox 18">
+            <a:extLst>
+              <a:ext uri="{FF2B5EF4-FFF2-40B4-BE49-F238E27FC236}">
+                <a16:creationId xmlns:a16="http://schemas.microsoft.com/office/drawing/2014/main" id="{CE3C6C88-0A3B-37C0-E694-1C18A13936EB}"/>
+              </a:ext>
+            </a:extLst>
+          </p:cNvPr>
+          <p:cNvSpPr txBox="1"/>
+          <p:nvPr/>
+        </p:nvSpPr>
+        <p:spPr>
+          <a:xfrm rot="19730451">
+            <a:off x="5309005" y="4264451"/>
+            <a:ext cx="996950" cy="276999"/>
+          </a:xfrm>
+          <a:prstGeom prst="rect">
+            <a:avLst/>
+          </a:prstGeom>
+          <a:noFill/>
+        </p:spPr>
+        <p:txBody>
+          <a:bodyPr wrap="square" rtlCol="0">
+            <a:spAutoFit/>
+          </a:bodyPr>
+          <a:lstStyle/>
+          <a:p>
+            <a:r>
+              <a:rPr lang="en-SG" sz="1200" dirty="0"/>
+              <a:t>19 Feb 2023</a:t>
+            </a:r>
+          </a:p>
+        </p:txBody>
+      </p:sp>
+      <p:sp>
+        <p:nvSpPr>
+          <p:cNvPr id="20" name="TextBox 19">
+            <a:extLst>
+              <a:ext uri="{FF2B5EF4-FFF2-40B4-BE49-F238E27FC236}">
+                <a16:creationId xmlns:a16="http://schemas.microsoft.com/office/drawing/2014/main" id="{A116F6B0-B221-E871-D476-923A4C482365}"/>
+              </a:ext>
+            </a:extLst>
+          </p:cNvPr>
+          <p:cNvSpPr txBox="1"/>
+          <p:nvPr/>
+        </p:nvSpPr>
+        <p:spPr>
+          <a:xfrm rot="19730451">
+            <a:off x="6353276" y="4260292"/>
+            <a:ext cx="996950" cy="276999"/>
+          </a:xfrm>
+          <a:prstGeom prst="rect">
+            <a:avLst/>
+          </a:prstGeom>
+          <a:noFill/>
+        </p:spPr>
+        <p:txBody>
+          <a:bodyPr wrap="square" rtlCol="0">
+            <a:spAutoFit/>
+          </a:bodyPr>
+          <a:lstStyle/>
+          <a:p>
+            <a:r>
+              <a:rPr lang="en-SG" sz="1200" dirty="0"/>
+              <a:t>5 Mar 2023</a:t>
+            </a:r>
+          </a:p>
+        </p:txBody>
+      </p:sp>
+      <p:sp>
+        <p:nvSpPr>
+          <p:cNvPr id="21" name="TextBox 20">
+            <a:extLst>
+              <a:ext uri="{FF2B5EF4-FFF2-40B4-BE49-F238E27FC236}">
+                <a16:creationId xmlns:a16="http://schemas.microsoft.com/office/drawing/2014/main" id="{C5BAB032-5BAD-4F88-9005-81F6710C3666}"/>
+              </a:ext>
+            </a:extLst>
+          </p:cNvPr>
+          <p:cNvSpPr txBox="1"/>
+          <p:nvPr/>
+        </p:nvSpPr>
+        <p:spPr>
+          <a:xfrm rot="19730451">
+            <a:off x="1970340" y="4263515"/>
+            <a:ext cx="996950" cy="276999"/>
+          </a:xfrm>
+          <a:prstGeom prst="rect">
+            <a:avLst/>
+          </a:prstGeom>
+          <a:noFill/>
+        </p:spPr>
+        <p:txBody>
+          <a:bodyPr wrap="square" rtlCol="0">
+            <a:spAutoFit/>
+          </a:bodyPr>
+          <a:lstStyle/>
+          <a:p>
+            <a:r>
+              <a:rPr lang="en-SG" sz="1200" dirty="0"/>
+              <a:t>8 Jan 2023</a:t>
+            </a:r>
+          </a:p>
+        </p:txBody>
+      </p:sp>
+      <p:sp>
+        <p:nvSpPr>
+          <p:cNvPr id="22" name="TextBox 21">
+            <a:extLst>
+              <a:ext uri="{FF2B5EF4-FFF2-40B4-BE49-F238E27FC236}">
+                <a16:creationId xmlns:a16="http://schemas.microsoft.com/office/drawing/2014/main" id="{AE1395EA-0AD9-4C6C-80AB-AEBC2E590067}"/>
+              </a:ext>
+            </a:extLst>
+          </p:cNvPr>
+          <p:cNvSpPr txBox="1"/>
+          <p:nvPr/>
+        </p:nvSpPr>
+        <p:spPr>
+          <a:xfrm rot="19730451">
+            <a:off x="7452151" y="4299852"/>
+            <a:ext cx="996950" cy="276999"/>
+          </a:xfrm>
+          <a:prstGeom prst="rect">
+            <a:avLst/>
+          </a:prstGeom>
+          <a:noFill/>
+        </p:spPr>
+        <p:txBody>
+          <a:bodyPr wrap="square" rtlCol="0">
+            <a:spAutoFit/>
+          </a:bodyPr>
+          <a:lstStyle/>
+          <a:p>
+            <a:r>
+              <a:rPr lang="en-SG" sz="1200" dirty="0"/>
+              <a:t>19 Mar 2023</a:t>
+            </a:r>
+          </a:p>
+        </p:txBody>
+      </p:sp>
+      <p:sp>
+        <p:nvSpPr>
+          <p:cNvPr id="23" name="TextBox 22">
+            <a:extLst>
+              <a:ext uri="{FF2B5EF4-FFF2-40B4-BE49-F238E27FC236}">
+                <a16:creationId xmlns:a16="http://schemas.microsoft.com/office/drawing/2014/main" id="{D00BBEE9-5FDF-1818-B937-2AD3B5A3645E}"/>
+              </a:ext>
+            </a:extLst>
+          </p:cNvPr>
+          <p:cNvSpPr txBox="1"/>
+          <p:nvPr/>
+        </p:nvSpPr>
+        <p:spPr>
+          <a:xfrm rot="19730451">
+            <a:off x="8600629" y="4299852"/>
+            <a:ext cx="996950" cy="276999"/>
+          </a:xfrm>
+          <a:prstGeom prst="rect">
+            <a:avLst/>
+          </a:prstGeom>
+          <a:noFill/>
+        </p:spPr>
+        <p:txBody>
+          <a:bodyPr wrap="square" rtlCol="0">
+            <a:spAutoFit/>
+          </a:bodyPr>
+          <a:lstStyle/>
+          <a:p>
+            <a:r>
+              <a:rPr lang="en-SG" sz="1200" dirty="0"/>
+              <a:t>2 Apr 2023</a:t>
+            </a:r>
+          </a:p>
+        </p:txBody>
+      </p:sp>
+      <p:grpSp>
+        <p:nvGrpSpPr>
+          <p:cNvPr id="30" name="Group 29">
+            <a:extLst>
+              <a:ext uri="{FF2B5EF4-FFF2-40B4-BE49-F238E27FC236}">
+                <a16:creationId xmlns:a16="http://schemas.microsoft.com/office/drawing/2014/main" id="{0E56F96D-DDBF-B17E-042F-DBF90547D33A}"/>
+              </a:ext>
+            </a:extLst>
+          </p:cNvPr>
+          <p:cNvGrpSpPr/>
+          <p:nvPr/>
+        </p:nvGrpSpPr>
+        <p:grpSpPr>
+          <a:xfrm>
+            <a:off x="2209582" y="2030605"/>
+            <a:ext cx="1797152" cy="2039744"/>
+            <a:chOff x="2209582" y="2030605"/>
+            <a:chExt cx="1797152" cy="2039744"/>
+          </a:xfrm>
+        </p:grpSpPr>
+        <p:cxnSp>
+          <p:nvCxnSpPr>
+            <p:cNvPr id="25" name="Straight Connector 24">
+              <a:extLst>
+                <a:ext uri="{FF2B5EF4-FFF2-40B4-BE49-F238E27FC236}">
+                  <a16:creationId xmlns:a16="http://schemas.microsoft.com/office/drawing/2014/main" id="{77020659-5290-3F57-4326-E3E03881B2AE}"/>
+                </a:ext>
+              </a:extLst>
+            </p:cNvPr>
+            <p:cNvCxnSpPr>
+              <a:cxnSpLocks/>
+            </p:cNvCxnSpPr>
+            <p:nvPr/>
+          </p:nvCxnSpPr>
+          <p:spPr>
+            <a:xfrm flipH="1" flipV="1">
+              <a:off x="3121299" y="2527666"/>
+              <a:ext cx="10374" cy="1542683"/>
+            </a:xfrm>
+            <a:prstGeom prst="line">
+              <a:avLst/>
+            </a:prstGeom>
+            <a:ln w="12700">
+              <a:prstDash val="dash"/>
+            </a:ln>
+          </p:spPr>
+          <p:style>
+            <a:lnRef idx="1">
+              <a:schemeClr val="dk1"/>
+            </a:lnRef>
+            <a:fillRef idx="0">
+              <a:schemeClr val="dk1"/>
+            </a:fillRef>
+            <a:effectRef idx="0">
+              <a:schemeClr val="dk1"/>
+            </a:effectRef>
+            <a:fontRef idx="minor">
+              <a:schemeClr val="tx1"/>
+            </a:fontRef>
+          </p:style>
+        </p:cxnSp>
+        <p:sp>
+          <p:nvSpPr>
+            <p:cNvPr id="27" name="Diamond 26">
+              <a:extLst>
+                <a:ext uri="{FF2B5EF4-FFF2-40B4-BE49-F238E27FC236}">
+                  <a16:creationId xmlns:a16="http://schemas.microsoft.com/office/drawing/2014/main" id="{87874E5B-E107-8505-21FD-A98D5BD10A3C}"/>
+                </a:ext>
+              </a:extLst>
+            </p:cNvPr>
+            <p:cNvSpPr/>
+            <p:nvPr/>
+          </p:nvSpPr>
+          <p:spPr>
+            <a:xfrm>
+              <a:off x="3044169" y="2453106"/>
+              <a:ext cx="154260" cy="184516"/>
+            </a:xfrm>
+            <a:prstGeom prst="diamond">
+              <a:avLst/>
+            </a:prstGeom>
+            <a:solidFill>
+              <a:schemeClr val="tx1"/>
+            </a:solidFill>
+            <a:ln>
+              <a:noFill/>
+            </a:ln>
+          </p:spPr>
+          <p:style>
+            <a:lnRef idx="2">
+              <a:schemeClr val="accent1">
+                <a:shade val="50000"/>
+              </a:schemeClr>
+            </a:lnRef>
+            <a:fillRef idx="1">
+              <a:schemeClr val="accent1"/>
+            </a:fillRef>
+            <a:effectRef idx="0">
+              <a:schemeClr val="accent1"/>
+            </a:effectRef>
+            <a:fontRef idx="minor">
+              <a:schemeClr val="lt1"/>
+            </a:fontRef>
+          </p:style>
+          <p:txBody>
+            <a:bodyPr rtlCol="0" anchor="ctr"/>
+            <a:lstStyle/>
+            <a:p>
+              <a:pPr algn="ctr"/>
+              <a:endParaRPr lang="en-SG"/>
+            </a:p>
+          </p:txBody>
+        </p:sp>
+        <p:sp>
+          <p:nvSpPr>
+            <p:cNvPr id="28" name="TextBox 27">
+              <a:extLst>
+                <a:ext uri="{FF2B5EF4-FFF2-40B4-BE49-F238E27FC236}">
+                  <a16:creationId xmlns:a16="http://schemas.microsoft.com/office/drawing/2014/main" id="{6F29F91F-5418-5D12-A6FE-5EAA6600FB72}"/>
+                </a:ext>
+              </a:extLst>
+            </p:cNvPr>
+            <p:cNvSpPr txBox="1"/>
+            <p:nvPr/>
+          </p:nvSpPr>
+          <p:spPr>
+            <a:xfrm>
+              <a:off x="2209582" y="2030605"/>
+              <a:ext cx="1797152" cy="461665"/>
+            </a:xfrm>
+            <a:prstGeom prst="rect">
+              <a:avLst/>
+            </a:prstGeom>
+            <a:noFill/>
+          </p:spPr>
+          <p:txBody>
+            <a:bodyPr wrap="square" rtlCol="0">
+              <a:spAutoFit/>
+            </a:bodyPr>
+            <a:lstStyle/>
+            <a:p>
+              <a:pPr algn="ctr"/>
+              <a:r>
+                <a:rPr lang="en-SG" sz="1200" dirty="0"/>
+                <a:t>Kick-Off </a:t>
+              </a:r>
+            </a:p>
+            <a:p>
+              <a:pPr algn="ctr"/>
+              <a:r>
+                <a:rPr lang="en-SG" sz="1200" dirty="0"/>
+                <a:t>Meeting, 14 Jan</a:t>
+              </a:r>
+            </a:p>
+          </p:txBody>
+        </p:sp>
+      </p:grpSp>
+      <p:grpSp>
+        <p:nvGrpSpPr>
+          <p:cNvPr id="31" name="Group 30">
+            <a:extLst>
+              <a:ext uri="{FF2B5EF4-FFF2-40B4-BE49-F238E27FC236}">
+                <a16:creationId xmlns:a16="http://schemas.microsoft.com/office/drawing/2014/main" id="{841C5A77-53A9-EBEC-2280-A8802E89CF35}"/>
+              </a:ext>
+            </a:extLst>
+          </p:cNvPr>
+          <p:cNvGrpSpPr/>
+          <p:nvPr/>
+        </p:nvGrpSpPr>
+        <p:grpSpPr>
+          <a:xfrm>
+            <a:off x="4484858" y="2066001"/>
+            <a:ext cx="1797152" cy="1995910"/>
+            <a:chOff x="2222723" y="2018005"/>
+            <a:chExt cx="1797152" cy="1995910"/>
+          </a:xfrm>
+        </p:grpSpPr>
+        <p:cxnSp>
+          <p:nvCxnSpPr>
+            <p:cNvPr id="32" name="Straight Connector 31">
+              <a:extLst>
+                <a:ext uri="{FF2B5EF4-FFF2-40B4-BE49-F238E27FC236}">
+                  <a16:creationId xmlns:a16="http://schemas.microsoft.com/office/drawing/2014/main" id="{4548F884-B043-7A69-7979-44E9180AC3A4}"/>
+                </a:ext>
+              </a:extLst>
+            </p:cNvPr>
+            <p:cNvCxnSpPr>
+              <a:cxnSpLocks/>
+            </p:cNvCxnSpPr>
+            <p:nvPr/>
+          </p:nvCxnSpPr>
+          <p:spPr>
+            <a:xfrm flipH="1" flipV="1">
+              <a:off x="3121299" y="2527666"/>
+              <a:ext cx="18458" cy="1486249"/>
+            </a:xfrm>
+            <a:prstGeom prst="line">
+              <a:avLst/>
+            </a:prstGeom>
+            <a:ln w="12700">
+              <a:prstDash val="dash"/>
+            </a:ln>
+          </p:spPr>
+          <p:style>
+            <a:lnRef idx="1">
+              <a:schemeClr val="dk1"/>
+            </a:lnRef>
+            <a:fillRef idx="0">
+              <a:schemeClr val="dk1"/>
+            </a:fillRef>
+            <a:effectRef idx="0">
+              <a:schemeClr val="dk1"/>
+            </a:effectRef>
+            <a:fontRef idx="minor">
+              <a:schemeClr val="tx1"/>
+            </a:fontRef>
+          </p:style>
+        </p:cxnSp>
+        <p:sp>
+          <p:nvSpPr>
+            <p:cNvPr id="33" name="Diamond 32">
+              <a:extLst>
+                <a:ext uri="{FF2B5EF4-FFF2-40B4-BE49-F238E27FC236}">
+                  <a16:creationId xmlns:a16="http://schemas.microsoft.com/office/drawing/2014/main" id="{49C2E700-96D0-F374-00F5-3C875EF26B30}"/>
+                </a:ext>
+              </a:extLst>
+            </p:cNvPr>
+            <p:cNvSpPr/>
+            <p:nvPr/>
+          </p:nvSpPr>
+          <p:spPr>
+            <a:xfrm>
+              <a:off x="3044169" y="2453106"/>
+              <a:ext cx="154260" cy="184516"/>
+            </a:xfrm>
+            <a:prstGeom prst="diamond">
+              <a:avLst/>
+            </a:prstGeom>
+            <a:solidFill>
+              <a:schemeClr val="tx1"/>
+            </a:solidFill>
+            <a:ln>
+              <a:noFill/>
+            </a:ln>
+          </p:spPr>
+          <p:style>
+            <a:lnRef idx="2">
+              <a:schemeClr val="accent1">
+                <a:shade val="50000"/>
+              </a:schemeClr>
+            </a:lnRef>
+            <a:fillRef idx="1">
+              <a:schemeClr val="accent1"/>
+            </a:fillRef>
+            <a:effectRef idx="0">
+              <a:schemeClr val="accent1"/>
+            </a:effectRef>
+            <a:fontRef idx="minor">
+              <a:schemeClr val="lt1"/>
+            </a:fontRef>
+          </p:style>
+          <p:txBody>
+            <a:bodyPr rtlCol="0" anchor="ctr"/>
+            <a:lstStyle/>
+            <a:p>
+              <a:pPr algn="ctr"/>
+              <a:endParaRPr lang="en-SG"/>
+            </a:p>
+          </p:txBody>
+        </p:sp>
+        <p:sp>
+          <p:nvSpPr>
+            <p:cNvPr id="34" name="TextBox 33">
+              <a:extLst>
+                <a:ext uri="{FF2B5EF4-FFF2-40B4-BE49-F238E27FC236}">
+                  <a16:creationId xmlns:a16="http://schemas.microsoft.com/office/drawing/2014/main" id="{03B90E79-3B91-C2B4-107D-E6FD4BE03104}"/>
+                </a:ext>
+              </a:extLst>
+            </p:cNvPr>
+            <p:cNvSpPr txBox="1"/>
+            <p:nvPr/>
+          </p:nvSpPr>
+          <p:spPr>
+            <a:xfrm>
+              <a:off x="2222723" y="2018005"/>
+              <a:ext cx="1797152" cy="461665"/>
+            </a:xfrm>
+            <a:prstGeom prst="rect">
+              <a:avLst/>
+            </a:prstGeom>
+            <a:noFill/>
+          </p:spPr>
+          <p:txBody>
+            <a:bodyPr wrap="square" rtlCol="0">
+              <a:spAutoFit/>
+            </a:bodyPr>
+            <a:lstStyle/>
+            <a:p>
+              <a:pPr algn="ctr"/>
+              <a:r>
+                <a:rPr lang="en-SG" sz="1200" dirty="0"/>
+                <a:t>Proposal due, </a:t>
+              </a:r>
+            </a:p>
+            <a:p>
+              <a:pPr algn="ctr"/>
+              <a:r>
+                <a:rPr lang="en-SG" sz="1200" dirty="0"/>
+                <a:t>12 Feb</a:t>
+              </a:r>
+            </a:p>
+          </p:txBody>
+        </p:sp>
+      </p:grpSp>
+      <p:grpSp>
+        <p:nvGrpSpPr>
+          <p:cNvPr id="37" name="Group 36">
+            <a:extLst>
+              <a:ext uri="{FF2B5EF4-FFF2-40B4-BE49-F238E27FC236}">
+                <a16:creationId xmlns:a16="http://schemas.microsoft.com/office/drawing/2014/main" id="{FF849568-74C1-236B-B6E9-C8477CE3A879}"/>
+              </a:ext>
+            </a:extLst>
+          </p:cNvPr>
+          <p:cNvGrpSpPr/>
+          <p:nvPr/>
+        </p:nvGrpSpPr>
+        <p:grpSpPr>
+          <a:xfrm>
+            <a:off x="8352300" y="2066001"/>
+            <a:ext cx="1797152" cy="1995910"/>
+            <a:chOff x="2222723" y="2018005"/>
+            <a:chExt cx="1797152" cy="1995910"/>
+          </a:xfrm>
+        </p:grpSpPr>
+        <p:cxnSp>
+          <p:nvCxnSpPr>
+            <p:cNvPr id="38" name="Straight Connector 37">
+              <a:extLst>
+                <a:ext uri="{FF2B5EF4-FFF2-40B4-BE49-F238E27FC236}">
+                  <a16:creationId xmlns:a16="http://schemas.microsoft.com/office/drawing/2014/main" id="{4E1ABA0A-0441-6D1D-DF3A-45CB7C162265}"/>
+                </a:ext>
+              </a:extLst>
+            </p:cNvPr>
+            <p:cNvCxnSpPr>
+              <a:cxnSpLocks/>
+            </p:cNvCxnSpPr>
+            <p:nvPr/>
+          </p:nvCxnSpPr>
+          <p:spPr>
+            <a:xfrm flipH="1" flipV="1">
+              <a:off x="3121299" y="2527666"/>
+              <a:ext cx="18458" cy="1486249"/>
+            </a:xfrm>
+            <a:prstGeom prst="line">
+              <a:avLst/>
+            </a:prstGeom>
+            <a:ln w="12700">
+              <a:prstDash val="dash"/>
+            </a:ln>
+          </p:spPr>
+          <p:style>
+            <a:lnRef idx="1">
+              <a:schemeClr val="dk1"/>
+            </a:lnRef>
+            <a:fillRef idx="0">
+              <a:schemeClr val="dk1"/>
+            </a:fillRef>
+            <a:effectRef idx="0">
+              <a:schemeClr val="dk1"/>
+            </a:effectRef>
+            <a:fontRef idx="minor">
+              <a:schemeClr val="tx1"/>
+            </a:fontRef>
+          </p:style>
+        </p:cxnSp>
+        <p:sp>
+          <p:nvSpPr>
+            <p:cNvPr id="39" name="Diamond 38">
+              <a:extLst>
+                <a:ext uri="{FF2B5EF4-FFF2-40B4-BE49-F238E27FC236}">
+                  <a16:creationId xmlns:a16="http://schemas.microsoft.com/office/drawing/2014/main" id="{E2652D11-22B7-86CD-7034-7786AAED667F}"/>
+                </a:ext>
+              </a:extLst>
+            </p:cNvPr>
+            <p:cNvSpPr/>
+            <p:nvPr/>
+          </p:nvSpPr>
+          <p:spPr>
+            <a:xfrm>
+              <a:off x="3044169" y="2453106"/>
+              <a:ext cx="154260" cy="184516"/>
+            </a:xfrm>
+            <a:prstGeom prst="diamond">
+              <a:avLst/>
+            </a:prstGeom>
+            <a:solidFill>
+              <a:schemeClr val="tx1"/>
+            </a:solidFill>
+            <a:ln>
+              <a:noFill/>
+            </a:ln>
+          </p:spPr>
+          <p:style>
+            <a:lnRef idx="2">
+              <a:schemeClr val="accent1">
+                <a:shade val="50000"/>
+              </a:schemeClr>
+            </a:lnRef>
+            <a:fillRef idx="1">
+              <a:schemeClr val="accent1"/>
+            </a:fillRef>
+            <a:effectRef idx="0">
+              <a:schemeClr val="accent1"/>
+            </a:effectRef>
+            <a:fontRef idx="minor">
+              <a:schemeClr val="lt1"/>
+            </a:fontRef>
+          </p:style>
+          <p:txBody>
+            <a:bodyPr rtlCol="0" anchor="ctr"/>
+            <a:lstStyle/>
+            <a:p>
+              <a:pPr algn="ctr"/>
+              <a:endParaRPr lang="en-SG"/>
+            </a:p>
+          </p:txBody>
+        </p:sp>
+        <p:sp>
+          <p:nvSpPr>
+            <p:cNvPr id="40" name="TextBox 39">
+              <a:extLst>
+                <a:ext uri="{FF2B5EF4-FFF2-40B4-BE49-F238E27FC236}">
+                  <a16:creationId xmlns:a16="http://schemas.microsoft.com/office/drawing/2014/main" id="{0FACF775-DC22-0D01-CA68-DDE3E5746FC6}"/>
+                </a:ext>
+              </a:extLst>
+            </p:cNvPr>
+            <p:cNvSpPr txBox="1"/>
+            <p:nvPr/>
+          </p:nvSpPr>
+          <p:spPr>
+            <a:xfrm>
+              <a:off x="2222723" y="2018005"/>
+              <a:ext cx="1797152" cy="461665"/>
+            </a:xfrm>
+            <a:prstGeom prst="rect">
+              <a:avLst/>
+            </a:prstGeom>
+            <a:noFill/>
+          </p:spPr>
+          <p:txBody>
+            <a:bodyPr wrap="square" rtlCol="0">
+              <a:spAutoFit/>
+            </a:bodyPr>
+            <a:lstStyle/>
+            <a:p>
+              <a:pPr algn="ctr"/>
+              <a:r>
+                <a:rPr lang="en-SG" sz="1200" dirty="0"/>
+                <a:t>Final Submission, </a:t>
+              </a:r>
+            </a:p>
+            <a:p>
+              <a:pPr algn="ctr"/>
+              <a:r>
+                <a:rPr lang="en-SG" sz="1200" dirty="0"/>
+                <a:t>2 Apr</a:t>
+              </a:r>
+            </a:p>
+          </p:txBody>
+        </p:sp>
+      </p:grpSp>
+      <p:sp>
+        <p:nvSpPr>
+          <p:cNvPr id="41" name="Rectangle 40">
+            <a:extLst>
+              <a:ext uri="{FF2B5EF4-FFF2-40B4-BE49-F238E27FC236}">
+                <a16:creationId xmlns:a16="http://schemas.microsoft.com/office/drawing/2014/main" id="{40180805-2FE1-94CF-4055-83734317C707}"/>
+              </a:ext>
+            </a:extLst>
+          </p:cNvPr>
+          <p:cNvSpPr/>
+          <p:nvPr/>
+        </p:nvSpPr>
+        <p:spPr>
+          <a:xfrm>
+            <a:off x="3064126" y="3349580"/>
+            <a:ext cx="1117600" cy="45719"/>
+          </a:xfrm>
+          <a:prstGeom prst="rect">
+            <a:avLst/>
+          </a:prstGeom>
+          <a:solidFill>
+            <a:schemeClr val="accent1">
+              <a:lumMod val="40000"/>
+              <a:lumOff val="60000"/>
+            </a:schemeClr>
+          </a:solidFill>
+          <a:ln>
+            <a:noFill/>
+          </a:ln>
+        </p:spPr>
+        <p:style>
+          <a:lnRef idx="2">
+            <a:schemeClr val="accent1">
+              <a:shade val="50000"/>
+            </a:schemeClr>
+          </a:lnRef>
+          <a:fillRef idx="1">
+            <a:schemeClr val="accent1"/>
+          </a:fillRef>
+          <a:effectRef idx="0">
+            <a:schemeClr val="accent1"/>
+          </a:effectRef>
+          <a:fontRef idx="minor">
+            <a:schemeClr val="lt1"/>
+          </a:fontRef>
+        </p:style>
+        <p:txBody>
+          <a:bodyPr rtlCol="0" anchor="ctr"/>
+          <a:lstStyle/>
+          <a:p>
+            <a:pPr algn="ctr"/>
+            <a:endParaRPr lang="en-SG"/>
+          </a:p>
+        </p:txBody>
+      </p:sp>
+      <p:sp>
+        <p:nvSpPr>
+          <p:cNvPr id="44" name="Oval 43">
+            <a:extLst>
+              <a:ext uri="{FF2B5EF4-FFF2-40B4-BE49-F238E27FC236}">
+                <a16:creationId xmlns:a16="http://schemas.microsoft.com/office/drawing/2014/main" id="{7C65179F-BDF2-8F28-7B12-36A2E5BF4F8A}"/>
+              </a:ext>
+            </a:extLst>
+          </p:cNvPr>
+          <p:cNvSpPr/>
+          <p:nvPr/>
+        </p:nvSpPr>
+        <p:spPr>
+          <a:xfrm>
+            <a:off x="4181726" y="3314182"/>
+            <a:ext cx="81116" cy="116513"/>
+          </a:xfrm>
+          <a:prstGeom prst="ellipse">
+            <a:avLst/>
+          </a:prstGeom>
+          <a:ln>
+            <a:noFill/>
+          </a:ln>
+        </p:spPr>
+        <p:style>
+          <a:lnRef idx="2">
+            <a:schemeClr val="accent1">
+              <a:shade val="50000"/>
+            </a:schemeClr>
+          </a:lnRef>
+          <a:fillRef idx="1">
+            <a:schemeClr val="accent1"/>
+          </a:fillRef>
+          <a:effectRef idx="0">
+            <a:schemeClr val="accent1"/>
+          </a:effectRef>
+          <a:fontRef idx="minor">
+            <a:schemeClr val="lt1"/>
+          </a:fontRef>
+        </p:style>
+        <p:txBody>
+          <a:bodyPr rtlCol="0" anchor="ctr"/>
+          <a:lstStyle/>
+          <a:p>
+            <a:pPr algn="ctr"/>
+            <a:endParaRPr lang="en-SG"/>
+          </a:p>
+        </p:txBody>
+      </p:sp>
+      <p:sp>
+        <p:nvSpPr>
+          <p:cNvPr id="45" name="Oval 44">
+            <a:extLst>
+              <a:ext uri="{FF2B5EF4-FFF2-40B4-BE49-F238E27FC236}">
+                <a16:creationId xmlns:a16="http://schemas.microsoft.com/office/drawing/2014/main" id="{1C1972BA-B872-1FD6-9FB3-923BD320687B}"/>
+              </a:ext>
+            </a:extLst>
+          </p:cNvPr>
+          <p:cNvSpPr/>
+          <p:nvPr/>
+        </p:nvSpPr>
+        <p:spPr>
+          <a:xfrm>
+            <a:off x="3064126" y="3335695"/>
+            <a:ext cx="81116" cy="116513"/>
+          </a:xfrm>
+          <a:prstGeom prst="ellipse">
+            <a:avLst/>
+          </a:prstGeom>
+          <a:ln>
+            <a:noFill/>
+          </a:ln>
+        </p:spPr>
+        <p:style>
+          <a:lnRef idx="2">
+            <a:schemeClr val="accent1">
+              <a:shade val="50000"/>
+            </a:schemeClr>
+          </a:lnRef>
+          <a:fillRef idx="1">
+            <a:schemeClr val="accent1"/>
+          </a:fillRef>
+          <a:effectRef idx="0">
+            <a:schemeClr val="accent1"/>
+          </a:effectRef>
+          <a:fontRef idx="minor">
+            <a:schemeClr val="lt1"/>
+          </a:fontRef>
+        </p:style>
+        <p:txBody>
+          <a:bodyPr rtlCol="0" anchor="ctr"/>
+          <a:lstStyle/>
+          <a:p>
+            <a:pPr algn="ctr"/>
+            <a:endParaRPr lang="en-SG"/>
+          </a:p>
+        </p:txBody>
+      </p:sp>
+      <p:sp>
+        <p:nvSpPr>
+          <p:cNvPr id="46" name="TextBox 45">
+            <a:extLst>
+              <a:ext uri="{FF2B5EF4-FFF2-40B4-BE49-F238E27FC236}">
+                <a16:creationId xmlns:a16="http://schemas.microsoft.com/office/drawing/2014/main" id="{066A02CC-C76C-340F-D37F-356A9927DE5D}"/>
+              </a:ext>
+            </a:extLst>
+          </p:cNvPr>
+          <p:cNvSpPr txBox="1"/>
+          <p:nvPr/>
+        </p:nvSpPr>
+        <p:spPr>
+          <a:xfrm>
+            <a:off x="3104684" y="3095439"/>
+            <a:ext cx="1117600" cy="276999"/>
+          </a:xfrm>
+          <a:prstGeom prst="rect">
+            <a:avLst/>
+          </a:prstGeom>
+          <a:noFill/>
+        </p:spPr>
+        <p:txBody>
+          <a:bodyPr wrap="square" rtlCol="0">
+            <a:spAutoFit/>
+          </a:bodyPr>
+          <a:lstStyle/>
+          <a:p>
+            <a:pPr algn="ctr"/>
+            <a:r>
+              <a:rPr lang="en-SG" sz="1200" dirty="0">
+                <a:solidFill>
+                  <a:schemeClr val="accent1"/>
+                </a:solidFill>
+              </a:rPr>
+              <a:t>Brainstorming</a:t>
+            </a:r>
+          </a:p>
+        </p:txBody>
+      </p:sp>
+      <p:grpSp>
+        <p:nvGrpSpPr>
+          <p:cNvPr id="47" name="Group 46">
+            <a:extLst>
+              <a:ext uri="{FF2B5EF4-FFF2-40B4-BE49-F238E27FC236}">
+                <a16:creationId xmlns:a16="http://schemas.microsoft.com/office/drawing/2014/main" id="{12B0AF24-E72D-731C-407B-7B311139BDB3}"/>
+              </a:ext>
+            </a:extLst>
+          </p:cNvPr>
+          <p:cNvGrpSpPr/>
+          <p:nvPr/>
+        </p:nvGrpSpPr>
+        <p:grpSpPr>
+          <a:xfrm>
+            <a:off x="3635406" y="2056996"/>
+            <a:ext cx="1155864" cy="1997974"/>
+            <a:chOff x="2543367" y="2015941"/>
+            <a:chExt cx="1155864" cy="1997974"/>
+          </a:xfrm>
+        </p:grpSpPr>
+        <p:cxnSp>
+          <p:nvCxnSpPr>
+            <p:cNvPr id="48" name="Straight Connector 47">
+              <a:extLst>
+                <a:ext uri="{FF2B5EF4-FFF2-40B4-BE49-F238E27FC236}">
+                  <a16:creationId xmlns:a16="http://schemas.microsoft.com/office/drawing/2014/main" id="{0A82A4E2-D20B-7A50-95F8-D363D74030FD}"/>
+                </a:ext>
+              </a:extLst>
+            </p:cNvPr>
+            <p:cNvCxnSpPr>
+              <a:cxnSpLocks/>
+            </p:cNvCxnSpPr>
+            <p:nvPr/>
+          </p:nvCxnSpPr>
+          <p:spPr>
+            <a:xfrm flipH="1" flipV="1">
+              <a:off x="3121299" y="2527666"/>
+              <a:ext cx="18458" cy="1486249"/>
+            </a:xfrm>
+            <a:prstGeom prst="line">
+              <a:avLst/>
+            </a:prstGeom>
+            <a:ln w="12700">
+              <a:prstDash val="dash"/>
+            </a:ln>
+          </p:spPr>
+          <p:style>
+            <a:lnRef idx="1">
+              <a:schemeClr val="dk1"/>
+            </a:lnRef>
+            <a:fillRef idx="0">
+              <a:schemeClr val="dk1"/>
+            </a:fillRef>
+            <a:effectRef idx="0">
+              <a:schemeClr val="dk1"/>
+            </a:effectRef>
+            <a:fontRef idx="minor">
+              <a:schemeClr val="tx1"/>
+            </a:fontRef>
+          </p:style>
+        </p:cxnSp>
+        <p:sp>
+          <p:nvSpPr>
+            <p:cNvPr id="49" name="Diamond 48">
+              <a:extLst>
+                <a:ext uri="{FF2B5EF4-FFF2-40B4-BE49-F238E27FC236}">
+                  <a16:creationId xmlns:a16="http://schemas.microsoft.com/office/drawing/2014/main" id="{F5BEFA28-97B9-48CE-D67D-731C41318715}"/>
+                </a:ext>
+              </a:extLst>
+            </p:cNvPr>
+            <p:cNvSpPr/>
+            <p:nvPr/>
+          </p:nvSpPr>
+          <p:spPr>
+            <a:xfrm>
+              <a:off x="3044169" y="2453106"/>
+              <a:ext cx="154260" cy="184516"/>
+            </a:xfrm>
+            <a:prstGeom prst="diamond">
+              <a:avLst/>
+            </a:prstGeom>
+            <a:solidFill>
+              <a:schemeClr val="tx1"/>
+            </a:solidFill>
+            <a:ln>
+              <a:noFill/>
+            </a:ln>
+          </p:spPr>
+          <p:style>
+            <a:lnRef idx="2">
+              <a:schemeClr val="accent1">
+                <a:shade val="50000"/>
+              </a:schemeClr>
+            </a:lnRef>
+            <a:fillRef idx="1">
+              <a:schemeClr val="accent1"/>
+            </a:fillRef>
+            <a:effectRef idx="0">
+              <a:schemeClr val="accent1"/>
+            </a:effectRef>
+            <a:fontRef idx="minor">
+              <a:schemeClr val="lt1"/>
+            </a:fontRef>
+          </p:style>
+          <p:txBody>
+            <a:bodyPr rtlCol="0" anchor="ctr"/>
+            <a:lstStyle/>
+            <a:p>
+              <a:pPr algn="ctr"/>
+              <a:endParaRPr lang="en-SG"/>
+            </a:p>
+          </p:txBody>
+        </p:sp>
+        <p:sp>
+          <p:nvSpPr>
+            <p:cNvPr id="50" name="TextBox 49">
+              <a:extLst>
+                <a:ext uri="{FF2B5EF4-FFF2-40B4-BE49-F238E27FC236}">
+                  <a16:creationId xmlns:a16="http://schemas.microsoft.com/office/drawing/2014/main" id="{890566DE-E320-4844-4984-FD4C1C778BAD}"/>
+                </a:ext>
+              </a:extLst>
+            </p:cNvPr>
+            <p:cNvSpPr txBox="1"/>
+            <p:nvPr/>
+          </p:nvSpPr>
+          <p:spPr>
+            <a:xfrm>
+              <a:off x="2543367" y="2015941"/>
+              <a:ext cx="1155864" cy="461665"/>
+            </a:xfrm>
+            <a:prstGeom prst="rect">
+              <a:avLst/>
+            </a:prstGeom>
+            <a:noFill/>
+          </p:spPr>
+          <p:txBody>
+            <a:bodyPr wrap="square" rtlCol="0">
+              <a:spAutoFit/>
+            </a:bodyPr>
+            <a:lstStyle/>
+            <a:p>
+              <a:pPr algn="ctr"/>
+              <a:r>
+                <a:rPr lang="en-SG" sz="1200" dirty="0"/>
+                <a:t>Prof Consultation</a:t>
+              </a:r>
+            </a:p>
+          </p:txBody>
+        </p:sp>
+      </p:grpSp>
+      <p:sp>
+        <p:nvSpPr>
+          <p:cNvPr id="52" name="Oval 51">
+            <a:extLst>
+              <a:ext uri="{FF2B5EF4-FFF2-40B4-BE49-F238E27FC236}">
+                <a16:creationId xmlns:a16="http://schemas.microsoft.com/office/drawing/2014/main" id="{93EB661E-F5C1-8495-C3D4-FBD6AB3747B6}"/>
+              </a:ext>
+            </a:extLst>
+          </p:cNvPr>
+          <p:cNvSpPr/>
+          <p:nvPr/>
+        </p:nvSpPr>
+        <p:spPr>
+          <a:xfrm>
+            <a:off x="5352105" y="3304972"/>
+            <a:ext cx="81116" cy="116513"/>
+          </a:xfrm>
+          <a:prstGeom prst="ellipse">
+            <a:avLst/>
+          </a:prstGeom>
+          <a:ln>
+            <a:noFill/>
+          </a:ln>
+        </p:spPr>
+        <p:style>
+          <a:lnRef idx="2">
+            <a:schemeClr val="accent1">
+              <a:shade val="50000"/>
+            </a:schemeClr>
+          </a:lnRef>
+          <a:fillRef idx="1">
+            <a:schemeClr val="accent1"/>
+          </a:fillRef>
+          <a:effectRef idx="0">
+            <a:schemeClr val="accent1"/>
+          </a:effectRef>
+          <a:fontRef idx="minor">
+            <a:schemeClr val="lt1"/>
+          </a:fontRef>
+        </p:style>
+        <p:txBody>
+          <a:bodyPr rtlCol="0" anchor="ctr"/>
+          <a:lstStyle/>
+          <a:p>
+            <a:pPr algn="ctr"/>
+            <a:endParaRPr lang="en-SG"/>
+          </a:p>
+        </p:txBody>
+      </p:sp>
+      <p:sp>
+        <p:nvSpPr>
+          <p:cNvPr id="54" name="TextBox 53">
+            <a:extLst>
+              <a:ext uri="{FF2B5EF4-FFF2-40B4-BE49-F238E27FC236}">
+                <a16:creationId xmlns:a16="http://schemas.microsoft.com/office/drawing/2014/main" id="{7912F0FA-D82D-9D03-C28A-16C21B42B0E3}"/>
+              </a:ext>
+            </a:extLst>
+          </p:cNvPr>
+          <p:cNvSpPr txBox="1"/>
+          <p:nvPr/>
+        </p:nvSpPr>
+        <p:spPr>
+          <a:xfrm>
+            <a:off x="4247527" y="2897248"/>
+            <a:ext cx="1117600" cy="461665"/>
+          </a:xfrm>
+          <a:prstGeom prst="rect">
+            <a:avLst/>
+          </a:prstGeom>
+          <a:noFill/>
+        </p:spPr>
+        <p:txBody>
+          <a:bodyPr wrap="square" rtlCol="0">
+            <a:spAutoFit/>
+          </a:bodyPr>
+          <a:lstStyle/>
+          <a:p>
+            <a:pPr algn="ctr"/>
+            <a:r>
+              <a:rPr lang="en-SG" sz="1200" dirty="0">
+                <a:solidFill>
+                  <a:schemeClr val="accent1"/>
+                </a:solidFill>
+              </a:rPr>
+              <a:t>Proposal Preparation</a:t>
+            </a:r>
+          </a:p>
+        </p:txBody>
+      </p:sp>
+      <p:sp>
+        <p:nvSpPr>
+          <p:cNvPr id="58" name="Rectangle 57">
+            <a:extLst>
+              <a:ext uri="{FF2B5EF4-FFF2-40B4-BE49-F238E27FC236}">
+                <a16:creationId xmlns:a16="http://schemas.microsoft.com/office/drawing/2014/main" id="{80EDF3FC-3140-FB33-A145-1000C156C54C}"/>
+              </a:ext>
+            </a:extLst>
+          </p:cNvPr>
+          <p:cNvSpPr/>
+          <p:nvPr/>
+        </p:nvSpPr>
+        <p:spPr>
+          <a:xfrm>
+            <a:off x="3952984" y="3714642"/>
+            <a:ext cx="1448908" cy="59272"/>
+          </a:xfrm>
+          <a:prstGeom prst="rect">
+            <a:avLst/>
+          </a:prstGeom>
+          <a:solidFill>
+            <a:schemeClr val="accent1">
+              <a:lumMod val="40000"/>
+              <a:lumOff val="60000"/>
+            </a:schemeClr>
+          </a:solidFill>
+          <a:ln>
+            <a:noFill/>
+          </a:ln>
+        </p:spPr>
+        <p:style>
+          <a:lnRef idx="2">
+            <a:schemeClr val="accent1">
+              <a:shade val="50000"/>
+            </a:schemeClr>
+          </a:lnRef>
+          <a:fillRef idx="1">
+            <a:schemeClr val="accent1"/>
+          </a:fillRef>
+          <a:effectRef idx="0">
+            <a:schemeClr val="accent1"/>
+          </a:effectRef>
+          <a:fontRef idx="minor">
+            <a:schemeClr val="lt1"/>
+          </a:fontRef>
+        </p:style>
+        <p:txBody>
+          <a:bodyPr rtlCol="0" anchor="ctr"/>
+          <a:lstStyle/>
+          <a:p>
+            <a:pPr algn="ctr"/>
+            <a:endParaRPr lang="en-SG"/>
+          </a:p>
+        </p:txBody>
+      </p:sp>
+      <p:sp>
+        <p:nvSpPr>
+          <p:cNvPr id="59" name="Oval 58">
+            <a:extLst>
+              <a:ext uri="{FF2B5EF4-FFF2-40B4-BE49-F238E27FC236}">
+                <a16:creationId xmlns:a16="http://schemas.microsoft.com/office/drawing/2014/main" id="{FD930637-3365-88C2-9CCF-C2C9646F1695}"/>
+              </a:ext>
+            </a:extLst>
+          </p:cNvPr>
+          <p:cNvSpPr/>
+          <p:nvPr/>
+        </p:nvSpPr>
+        <p:spPr>
+          <a:xfrm>
+            <a:off x="3920092" y="3689480"/>
+            <a:ext cx="81116" cy="116513"/>
+          </a:xfrm>
+          <a:prstGeom prst="ellipse">
+            <a:avLst/>
+          </a:prstGeom>
+          <a:ln>
+            <a:noFill/>
+          </a:ln>
+        </p:spPr>
+        <p:style>
+          <a:lnRef idx="2">
+            <a:schemeClr val="accent1">
+              <a:shade val="50000"/>
+            </a:schemeClr>
+          </a:lnRef>
+          <a:fillRef idx="1">
+            <a:schemeClr val="accent1"/>
+          </a:fillRef>
+          <a:effectRef idx="0">
+            <a:schemeClr val="accent1"/>
+          </a:effectRef>
+          <a:fontRef idx="minor">
+            <a:schemeClr val="lt1"/>
+          </a:fontRef>
+        </p:style>
+        <p:txBody>
+          <a:bodyPr rtlCol="0" anchor="ctr"/>
+          <a:lstStyle/>
+          <a:p>
+            <a:pPr algn="ctr"/>
+            <a:endParaRPr lang="en-SG"/>
+          </a:p>
+        </p:txBody>
+      </p:sp>
+      <p:sp>
+        <p:nvSpPr>
+          <p:cNvPr id="60" name="TextBox 59">
+            <a:extLst>
+              <a:ext uri="{FF2B5EF4-FFF2-40B4-BE49-F238E27FC236}">
+                <a16:creationId xmlns:a16="http://schemas.microsoft.com/office/drawing/2014/main" id="{E4FAF8DC-1F1A-7699-70FB-C9A155A3C853}"/>
+              </a:ext>
+            </a:extLst>
+          </p:cNvPr>
+          <p:cNvSpPr txBox="1"/>
+          <p:nvPr/>
+        </p:nvSpPr>
+        <p:spPr>
+          <a:xfrm>
+            <a:off x="4133671" y="3467015"/>
+            <a:ext cx="1303250" cy="276999"/>
+          </a:xfrm>
+          <a:prstGeom prst="rect">
+            <a:avLst/>
+          </a:prstGeom>
+          <a:noFill/>
+        </p:spPr>
+        <p:txBody>
+          <a:bodyPr wrap="square" rtlCol="0">
+            <a:spAutoFit/>
+          </a:bodyPr>
+          <a:lstStyle/>
+          <a:p>
+            <a:pPr algn="ctr"/>
+            <a:r>
+              <a:rPr lang="en-SG" sz="1200" dirty="0">
+                <a:solidFill>
+                  <a:schemeClr val="accent1"/>
+                </a:solidFill>
+              </a:rPr>
+              <a:t>Data Exploration</a:t>
+            </a:r>
+          </a:p>
+        </p:txBody>
+      </p:sp>
+      <p:sp>
+        <p:nvSpPr>
+          <p:cNvPr id="61" name="Oval 60">
+            <a:extLst>
+              <a:ext uri="{FF2B5EF4-FFF2-40B4-BE49-F238E27FC236}">
+                <a16:creationId xmlns:a16="http://schemas.microsoft.com/office/drawing/2014/main" id="{71A2A09C-9B34-62C2-75D1-AD28F3E637CC}"/>
+              </a:ext>
+            </a:extLst>
+          </p:cNvPr>
+          <p:cNvSpPr/>
+          <p:nvPr/>
+        </p:nvSpPr>
+        <p:spPr>
+          <a:xfrm>
+            <a:off x="5376857" y="3677368"/>
+            <a:ext cx="81116" cy="116513"/>
+          </a:xfrm>
+          <a:prstGeom prst="ellipse">
+            <a:avLst/>
+          </a:prstGeom>
+          <a:ln>
+            <a:noFill/>
+          </a:ln>
+        </p:spPr>
+        <p:style>
+          <a:lnRef idx="2">
+            <a:schemeClr val="accent1">
+              <a:shade val="50000"/>
+            </a:schemeClr>
+          </a:lnRef>
+          <a:fillRef idx="1">
+            <a:schemeClr val="accent1"/>
+          </a:fillRef>
+          <a:effectRef idx="0">
+            <a:schemeClr val="accent1"/>
+          </a:effectRef>
+          <a:fontRef idx="minor">
+            <a:schemeClr val="lt1"/>
+          </a:fontRef>
+        </p:style>
+        <p:txBody>
+          <a:bodyPr rtlCol="0" anchor="ctr"/>
+          <a:lstStyle/>
+          <a:p>
+            <a:pPr algn="ctr"/>
+            <a:endParaRPr lang="en-SG"/>
+          </a:p>
+        </p:txBody>
+      </p:sp>
+      <p:sp>
+        <p:nvSpPr>
+          <p:cNvPr id="62" name="TextBox 61">
+            <a:extLst>
+              <a:ext uri="{FF2B5EF4-FFF2-40B4-BE49-F238E27FC236}">
+                <a16:creationId xmlns:a16="http://schemas.microsoft.com/office/drawing/2014/main" id="{17DADCF3-656E-23E7-31FC-F39EC8C0CF70}"/>
+              </a:ext>
+            </a:extLst>
+          </p:cNvPr>
+          <p:cNvSpPr txBox="1"/>
+          <p:nvPr/>
+        </p:nvSpPr>
+        <p:spPr>
+          <a:xfrm>
+            <a:off x="5250484" y="3487446"/>
+            <a:ext cx="1303250" cy="276999"/>
+          </a:xfrm>
+          <a:prstGeom prst="rect">
+            <a:avLst/>
+          </a:prstGeom>
+          <a:noFill/>
+        </p:spPr>
+        <p:txBody>
+          <a:bodyPr wrap="square" rtlCol="0">
+            <a:spAutoFit/>
+          </a:bodyPr>
+          <a:lstStyle/>
+          <a:p>
+            <a:pPr algn="ctr"/>
+            <a:r>
+              <a:rPr lang="en-SG" sz="1200" dirty="0">
+                <a:solidFill>
+                  <a:schemeClr val="accent1"/>
+                </a:solidFill>
+              </a:rPr>
+              <a:t>Data Prep</a:t>
+            </a:r>
+          </a:p>
+        </p:txBody>
+      </p:sp>
+      <p:sp>
+        <p:nvSpPr>
+          <p:cNvPr id="63" name="Rectangle 62">
+            <a:extLst>
+              <a:ext uri="{FF2B5EF4-FFF2-40B4-BE49-F238E27FC236}">
+                <a16:creationId xmlns:a16="http://schemas.microsoft.com/office/drawing/2014/main" id="{2FCC08C8-F904-E41B-4165-9F293080C2E1}"/>
+              </a:ext>
+            </a:extLst>
+          </p:cNvPr>
+          <p:cNvSpPr/>
+          <p:nvPr/>
+        </p:nvSpPr>
+        <p:spPr>
+          <a:xfrm>
+            <a:off x="5432583" y="3708998"/>
+            <a:ext cx="1037405" cy="61321"/>
+          </a:xfrm>
+          <a:prstGeom prst="rect">
+            <a:avLst/>
+          </a:prstGeom>
+          <a:solidFill>
+            <a:schemeClr val="accent1">
+              <a:lumMod val="40000"/>
+              <a:lumOff val="60000"/>
+            </a:schemeClr>
+          </a:solidFill>
+          <a:ln>
+            <a:noFill/>
+          </a:ln>
+        </p:spPr>
+        <p:style>
+          <a:lnRef idx="2">
+            <a:schemeClr val="accent1">
+              <a:shade val="50000"/>
+            </a:schemeClr>
+          </a:lnRef>
+          <a:fillRef idx="1">
+            <a:schemeClr val="accent1"/>
+          </a:fillRef>
+          <a:effectRef idx="0">
+            <a:schemeClr val="accent1"/>
+          </a:effectRef>
+          <a:fontRef idx="minor">
+            <a:schemeClr val="lt1"/>
+          </a:fontRef>
+        </p:style>
+        <p:txBody>
+          <a:bodyPr rtlCol="0" anchor="ctr"/>
+          <a:lstStyle/>
+          <a:p>
+            <a:pPr algn="ctr"/>
+            <a:endParaRPr lang="en-SG"/>
+          </a:p>
+        </p:txBody>
+      </p:sp>
+      <p:sp>
+        <p:nvSpPr>
+          <p:cNvPr id="65" name="TextBox 64">
+            <a:extLst>
+              <a:ext uri="{FF2B5EF4-FFF2-40B4-BE49-F238E27FC236}">
+                <a16:creationId xmlns:a16="http://schemas.microsoft.com/office/drawing/2014/main" id="{F2240154-A6C2-8422-EA64-F88D1911264F}"/>
+              </a:ext>
+            </a:extLst>
+          </p:cNvPr>
+          <p:cNvSpPr txBox="1"/>
+          <p:nvPr/>
+        </p:nvSpPr>
+        <p:spPr>
+          <a:xfrm>
+            <a:off x="5783480" y="3064650"/>
+            <a:ext cx="1303250" cy="276999"/>
+          </a:xfrm>
+          <a:prstGeom prst="rect">
+            <a:avLst/>
+          </a:prstGeom>
+          <a:noFill/>
+        </p:spPr>
+        <p:txBody>
+          <a:bodyPr wrap="square" rtlCol="0">
+            <a:spAutoFit/>
+          </a:bodyPr>
+          <a:lstStyle/>
+          <a:p>
+            <a:pPr algn="ctr"/>
+            <a:r>
+              <a:rPr lang="en-SG" sz="1200" dirty="0">
+                <a:solidFill>
+                  <a:schemeClr val="accent1"/>
+                </a:solidFill>
+              </a:rPr>
+              <a:t>Prelim Prototype</a:t>
+            </a:r>
+          </a:p>
+        </p:txBody>
+      </p:sp>
+      <p:sp>
+        <p:nvSpPr>
+          <p:cNvPr id="66" name="Rectangle 65">
+            <a:extLst>
+              <a:ext uri="{FF2B5EF4-FFF2-40B4-BE49-F238E27FC236}">
+                <a16:creationId xmlns:a16="http://schemas.microsoft.com/office/drawing/2014/main" id="{C7EFDB82-EE6A-FFDB-D073-EF6742C70F35}"/>
+              </a:ext>
+            </a:extLst>
+          </p:cNvPr>
+          <p:cNvSpPr/>
+          <p:nvPr/>
+        </p:nvSpPr>
+        <p:spPr>
+          <a:xfrm>
+            <a:off x="5868313" y="3324669"/>
+            <a:ext cx="1133584" cy="61321"/>
+          </a:xfrm>
+          <a:prstGeom prst="rect">
+            <a:avLst/>
+          </a:prstGeom>
+          <a:solidFill>
+            <a:schemeClr val="accent1">
+              <a:lumMod val="40000"/>
+              <a:lumOff val="60000"/>
+            </a:schemeClr>
+          </a:solidFill>
+          <a:ln>
+            <a:noFill/>
+          </a:ln>
+        </p:spPr>
+        <p:style>
+          <a:lnRef idx="2">
+            <a:schemeClr val="accent1">
+              <a:shade val="50000"/>
+            </a:schemeClr>
+          </a:lnRef>
+          <a:fillRef idx="1">
+            <a:schemeClr val="accent1"/>
+          </a:fillRef>
+          <a:effectRef idx="0">
+            <a:schemeClr val="accent1"/>
+          </a:effectRef>
+          <a:fontRef idx="minor">
+            <a:schemeClr val="lt1"/>
+          </a:fontRef>
+        </p:style>
+        <p:txBody>
+          <a:bodyPr rtlCol="0" anchor="ctr"/>
+          <a:lstStyle/>
+          <a:p>
+            <a:pPr algn="ctr"/>
+            <a:endParaRPr lang="en-SG"/>
+          </a:p>
+        </p:txBody>
+      </p:sp>
+      <p:sp>
+        <p:nvSpPr>
+          <p:cNvPr id="67" name="Oval 66">
+            <a:extLst>
+              <a:ext uri="{FF2B5EF4-FFF2-40B4-BE49-F238E27FC236}">
+                <a16:creationId xmlns:a16="http://schemas.microsoft.com/office/drawing/2014/main" id="{0C95B0F4-0CDB-57A4-AA0B-797D403553C4}"/>
+              </a:ext>
+            </a:extLst>
+          </p:cNvPr>
+          <p:cNvSpPr/>
+          <p:nvPr/>
+        </p:nvSpPr>
+        <p:spPr>
+          <a:xfrm>
+            <a:off x="6447725" y="3681232"/>
+            <a:ext cx="81116" cy="116513"/>
+          </a:xfrm>
+          <a:prstGeom prst="ellipse">
+            <a:avLst/>
+          </a:prstGeom>
+          <a:ln>
+            <a:noFill/>
+          </a:ln>
+        </p:spPr>
+        <p:style>
+          <a:lnRef idx="2">
+            <a:schemeClr val="accent1">
+              <a:shade val="50000"/>
+            </a:schemeClr>
+          </a:lnRef>
+          <a:fillRef idx="1">
+            <a:schemeClr val="accent1"/>
+          </a:fillRef>
+          <a:effectRef idx="0">
+            <a:schemeClr val="accent1"/>
+          </a:effectRef>
+          <a:fontRef idx="minor">
+            <a:schemeClr val="lt1"/>
+          </a:fontRef>
+        </p:style>
+        <p:txBody>
+          <a:bodyPr rtlCol="0" anchor="ctr"/>
+          <a:lstStyle/>
+          <a:p>
+            <a:pPr algn="ctr"/>
+            <a:endParaRPr lang="en-SG"/>
+          </a:p>
+        </p:txBody>
+      </p:sp>
+      <p:sp>
+        <p:nvSpPr>
+          <p:cNvPr id="69" name="TextBox 68">
+            <a:extLst>
+              <a:ext uri="{FF2B5EF4-FFF2-40B4-BE49-F238E27FC236}">
+                <a16:creationId xmlns:a16="http://schemas.microsoft.com/office/drawing/2014/main" id="{FFCADDB4-D2E9-EF92-D230-B2DEB64D0D67}"/>
+              </a:ext>
+            </a:extLst>
+          </p:cNvPr>
+          <p:cNvSpPr txBox="1"/>
+          <p:nvPr/>
+        </p:nvSpPr>
+        <p:spPr>
+          <a:xfrm>
+            <a:off x="6912947" y="2886161"/>
+            <a:ext cx="1303250" cy="461665"/>
+          </a:xfrm>
+          <a:prstGeom prst="rect">
+            <a:avLst/>
+          </a:prstGeom>
+          <a:noFill/>
+        </p:spPr>
+        <p:txBody>
+          <a:bodyPr wrap="square" rtlCol="0">
+            <a:spAutoFit/>
+          </a:bodyPr>
+          <a:lstStyle/>
+          <a:p>
+            <a:pPr algn="ctr"/>
+            <a:r>
+              <a:rPr lang="en-SG" sz="1200" dirty="0">
+                <a:solidFill>
+                  <a:schemeClr val="accent1"/>
+                </a:solidFill>
+              </a:rPr>
+              <a:t>Enhanced Prototype</a:t>
+            </a:r>
+          </a:p>
+        </p:txBody>
+      </p:sp>
+      <p:sp>
+        <p:nvSpPr>
+          <p:cNvPr id="70" name="Rectangle 69">
+            <a:extLst>
+              <a:ext uri="{FF2B5EF4-FFF2-40B4-BE49-F238E27FC236}">
+                <a16:creationId xmlns:a16="http://schemas.microsoft.com/office/drawing/2014/main" id="{222B9FBB-6DE5-BBBB-BBF0-86BA15851E90}"/>
+              </a:ext>
+            </a:extLst>
+          </p:cNvPr>
+          <p:cNvSpPr/>
+          <p:nvPr/>
+        </p:nvSpPr>
+        <p:spPr>
+          <a:xfrm>
+            <a:off x="7004259" y="3324668"/>
+            <a:ext cx="1133584" cy="61321"/>
+          </a:xfrm>
+          <a:prstGeom prst="rect">
+            <a:avLst/>
+          </a:prstGeom>
+          <a:solidFill>
+            <a:schemeClr val="accent1">
+              <a:lumMod val="40000"/>
+              <a:lumOff val="60000"/>
+            </a:schemeClr>
+          </a:solidFill>
+          <a:ln>
+            <a:noFill/>
+          </a:ln>
+        </p:spPr>
+        <p:style>
+          <a:lnRef idx="2">
+            <a:schemeClr val="accent1">
+              <a:shade val="50000"/>
+            </a:schemeClr>
+          </a:lnRef>
+          <a:fillRef idx="1">
+            <a:schemeClr val="accent1"/>
+          </a:fillRef>
+          <a:effectRef idx="0">
+            <a:schemeClr val="accent1"/>
+          </a:effectRef>
+          <a:fontRef idx="minor">
+            <a:schemeClr val="lt1"/>
+          </a:fontRef>
+        </p:style>
+        <p:txBody>
+          <a:bodyPr rtlCol="0" anchor="ctr"/>
+          <a:lstStyle/>
+          <a:p>
+            <a:pPr algn="ctr"/>
+            <a:endParaRPr lang="en-SG"/>
+          </a:p>
+        </p:txBody>
+      </p:sp>
+      <p:sp>
+        <p:nvSpPr>
+          <p:cNvPr id="71" name="Rectangle 70">
+            <a:extLst>
+              <a:ext uri="{FF2B5EF4-FFF2-40B4-BE49-F238E27FC236}">
+                <a16:creationId xmlns:a16="http://schemas.microsoft.com/office/drawing/2014/main" id="{41107F7E-8487-C00C-E1ED-D18FE5536114}"/>
+              </a:ext>
+            </a:extLst>
+          </p:cNvPr>
+          <p:cNvSpPr/>
+          <p:nvPr/>
+        </p:nvSpPr>
+        <p:spPr>
+          <a:xfrm>
+            <a:off x="7610936" y="3698070"/>
+            <a:ext cx="831387" cy="45719"/>
+          </a:xfrm>
+          <a:prstGeom prst="rect">
+            <a:avLst/>
+          </a:prstGeom>
+          <a:solidFill>
+            <a:schemeClr val="accent1">
+              <a:lumMod val="40000"/>
+              <a:lumOff val="60000"/>
+            </a:schemeClr>
+          </a:solidFill>
+          <a:ln>
+            <a:noFill/>
+          </a:ln>
+        </p:spPr>
+        <p:style>
+          <a:lnRef idx="2">
+            <a:schemeClr val="accent1">
+              <a:shade val="50000"/>
+            </a:schemeClr>
+          </a:lnRef>
+          <a:fillRef idx="1">
+            <a:schemeClr val="accent1"/>
+          </a:fillRef>
+          <a:effectRef idx="0">
+            <a:schemeClr val="accent1"/>
+          </a:effectRef>
+          <a:fontRef idx="minor">
+            <a:schemeClr val="lt1"/>
+          </a:fontRef>
+        </p:style>
+        <p:txBody>
+          <a:bodyPr rtlCol="0" anchor="ctr"/>
+          <a:lstStyle/>
+          <a:p>
+            <a:pPr algn="ctr"/>
+            <a:endParaRPr lang="en-SG"/>
+          </a:p>
+        </p:txBody>
+      </p:sp>
+      <p:sp>
+        <p:nvSpPr>
+          <p:cNvPr id="72" name="TextBox 71">
+            <a:extLst>
+              <a:ext uri="{FF2B5EF4-FFF2-40B4-BE49-F238E27FC236}">
+                <a16:creationId xmlns:a16="http://schemas.microsoft.com/office/drawing/2014/main" id="{050A7476-315E-7297-CC0E-2C8096E16E0F}"/>
+              </a:ext>
+            </a:extLst>
+          </p:cNvPr>
+          <p:cNvSpPr txBox="1"/>
+          <p:nvPr/>
+        </p:nvSpPr>
+        <p:spPr>
+          <a:xfrm>
+            <a:off x="7358874" y="3458473"/>
+            <a:ext cx="1303250" cy="276999"/>
+          </a:xfrm>
+          <a:prstGeom prst="rect">
+            <a:avLst/>
+          </a:prstGeom>
+          <a:noFill/>
+        </p:spPr>
+        <p:txBody>
+          <a:bodyPr wrap="square" rtlCol="0">
+            <a:spAutoFit/>
+          </a:bodyPr>
+          <a:lstStyle/>
+          <a:p>
+            <a:pPr algn="ctr"/>
+            <a:r>
+              <a:rPr lang="en-SG" sz="1200" dirty="0">
+                <a:solidFill>
+                  <a:schemeClr val="accent1"/>
+                </a:solidFill>
+              </a:rPr>
+              <a:t>Shiny App</a:t>
+            </a:r>
+          </a:p>
+        </p:txBody>
+      </p:sp>
+      <p:sp>
+        <p:nvSpPr>
+          <p:cNvPr id="73" name="Rectangle 72">
+            <a:extLst>
+              <a:ext uri="{FF2B5EF4-FFF2-40B4-BE49-F238E27FC236}">
+                <a16:creationId xmlns:a16="http://schemas.microsoft.com/office/drawing/2014/main" id="{8DB473E1-02E2-7AC5-3A90-32B1D7C9E33C}"/>
+              </a:ext>
+            </a:extLst>
+          </p:cNvPr>
+          <p:cNvSpPr/>
+          <p:nvPr/>
+        </p:nvSpPr>
+        <p:spPr>
+          <a:xfrm>
+            <a:off x="8444999" y="3698070"/>
+            <a:ext cx="831387" cy="45719"/>
+          </a:xfrm>
+          <a:prstGeom prst="rect">
+            <a:avLst/>
+          </a:prstGeom>
+          <a:solidFill>
+            <a:schemeClr val="accent1">
+              <a:lumMod val="40000"/>
+              <a:lumOff val="60000"/>
+            </a:schemeClr>
+          </a:solidFill>
+          <a:ln>
+            <a:noFill/>
+          </a:ln>
+        </p:spPr>
+        <p:style>
+          <a:lnRef idx="2">
+            <a:schemeClr val="accent1">
+              <a:shade val="50000"/>
+            </a:schemeClr>
+          </a:lnRef>
+          <a:fillRef idx="1">
+            <a:schemeClr val="accent1"/>
+          </a:fillRef>
+          <a:effectRef idx="0">
+            <a:schemeClr val="accent1"/>
+          </a:effectRef>
+          <a:fontRef idx="minor">
+            <a:schemeClr val="lt1"/>
+          </a:fontRef>
+        </p:style>
+        <p:txBody>
+          <a:bodyPr rtlCol="0" anchor="ctr"/>
+          <a:lstStyle/>
+          <a:p>
+            <a:pPr algn="ctr"/>
+            <a:endParaRPr lang="en-SG"/>
+          </a:p>
+        </p:txBody>
+      </p:sp>
+      <p:sp>
+        <p:nvSpPr>
+          <p:cNvPr id="74" name="TextBox 73">
+            <a:extLst>
+              <a:ext uri="{FF2B5EF4-FFF2-40B4-BE49-F238E27FC236}">
+                <a16:creationId xmlns:a16="http://schemas.microsoft.com/office/drawing/2014/main" id="{AF9A89B8-0B70-CE9E-539E-90F49D385199}"/>
+              </a:ext>
+            </a:extLst>
+          </p:cNvPr>
+          <p:cNvSpPr txBox="1"/>
+          <p:nvPr/>
+        </p:nvSpPr>
+        <p:spPr>
+          <a:xfrm>
+            <a:off x="8192937" y="3458473"/>
+            <a:ext cx="1303250" cy="276999"/>
+          </a:xfrm>
+          <a:prstGeom prst="rect">
+            <a:avLst/>
+          </a:prstGeom>
+          <a:noFill/>
+        </p:spPr>
+        <p:txBody>
+          <a:bodyPr wrap="square" rtlCol="0">
+            <a:spAutoFit/>
+          </a:bodyPr>
+          <a:lstStyle/>
+          <a:p>
+            <a:pPr algn="ctr"/>
+            <a:r>
+              <a:rPr lang="en-SG" sz="1200" dirty="0">
+                <a:solidFill>
+                  <a:schemeClr val="accent1"/>
+                </a:solidFill>
+              </a:rPr>
+              <a:t>Poster</a:t>
+            </a:r>
+          </a:p>
+        </p:txBody>
+      </p:sp>
+      <p:sp>
+        <p:nvSpPr>
+          <p:cNvPr id="75" name="Oval 74">
+            <a:extLst>
+              <a:ext uri="{FF2B5EF4-FFF2-40B4-BE49-F238E27FC236}">
+                <a16:creationId xmlns:a16="http://schemas.microsoft.com/office/drawing/2014/main" id="{D9C63C49-00AC-222C-8E1E-068423B81BF8}"/>
+              </a:ext>
+            </a:extLst>
+          </p:cNvPr>
+          <p:cNvSpPr/>
+          <p:nvPr/>
+        </p:nvSpPr>
+        <p:spPr>
+          <a:xfrm>
+            <a:off x="5836984" y="3298794"/>
+            <a:ext cx="81116" cy="116513"/>
+          </a:xfrm>
+          <a:prstGeom prst="ellipse">
+            <a:avLst/>
+          </a:prstGeom>
+          <a:ln>
+            <a:noFill/>
+          </a:ln>
+        </p:spPr>
+        <p:style>
+          <a:lnRef idx="2">
+            <a:schemeClr val="accent1">
+              <a:shade val="50000"/>
+            </a:schemeClr>
+          </a:lnRef>
+          <a:fillRef idx="1">
+            <a:schemeClr val="accent1"/>
+          </a:fillRef>
+          <a:effectRef idx="0">
+            <a:schemeClr val="accent1"/>
+          </a:effectRef>
+          <a:fontRef idx="minor">
+            <a:schemeClr val="lt1"/>
+          </a:fontRef>
+        </p:style>
+        <p:txBody>
+          <a:bodyPr rtlCol="0" anchor="ctr"/>
+          <a:lstStyle/>
+          <a:p>
+            <a:pPr algn="ctr"/>
+            <a:endParaRPr lang="en-SG"/>
+          </a:p>
+        </p:txBody>
+      </p:sp>
+      <p:sp>
+        <p:nvSpPr>
+          <p:cNvPr id="76" name="Oval 75">
+            <a:extLst>
+              <a:ext uri="{FF2B5EF4-FFF2-40B4-BE49-F238E27FC236}">
+                <a16:creationId xmlns:a16="http://schemas.microsoft.com/office/drawing/2014/main" id="{49CB294E-89EE-AA56-BD80-997CDE82DE3F}"/>
+              </a:ext>
+            </a:extLst>
+          </p:cNvPr>
+          <p:cNvSpPr/>
+          <p:nvPr/>
+        </p:nvSpPr>
+        <p:spPr>
+          <a:xfrm>
+            <a:off x="8090879" y="3289570"/>
+            <a:ext cx="81116" cy="116513"/>
+          </a:xfrm>
+          <a:prstGeom prst="ellipse">
+            <a:avLst/>
+          </a:prstGeom>
+          <a:ln>
+            <a:noFill/>
+          </a:ln>
+        </p:spPr>
+        <p:style>
+          <a:lnRef idx="2">
+            <a:schemeClr val="accent1">
+              <a:shade val="50000"/>
+            </a:schemeClr>
+          </a:lnRef>
+          <a:fillRef idx="1">
+            <a:schemeClr val="accent1"/>
+          </a:fillRef>
+          <a:effectRef idx="0">
+            <a:schemeClr val="accent1"/>
+          </a:effectRef>
+          <a:fontRef idx="minor">
+            <a:schemeClr val="lt1"/>
+          </a:fontRef>
+        </p:style>
+        <p:txBody>
+          <a:bodyPr rtlCol="0" anchor="ctr"/>
+          <a:lstStyle/>
+          <a:p>
+            <a:pPr algn="ctr"/>
+            <a:endParaRPr lang="en-SG"/>
+          </a:p>
+        </p:txBody>
+      </p:sp>
+      <p:sp>
+        <p:nvSpPr>
+          <p:cNvPr id="77" name="Oval 76">
+            <a:extLst>
+              <a:ext uri="{FF2B5EF4-FFF2-40B4-BE49-F238E27FC236}">
+                <a16:creationId xmlns:a16="http://schemas.microsoft.com/office/drawing/2014/main" id="{55D8D978-A171-F1B4-9336-7603872F63C4}"/>
+              </a:ext>
+            </a:extLst>
+          </p:cNvPr>
+          <p:cNvSpPr/>
+          <p:nvPr/>
+        </p:nvSpPr>
+        <p:spPr>
+          <a:xfrm>
+            <a:off x="7042531" y="3300656"/>
+            <a:ext cx="81116" cy="116513"/>
+          </a:xfrm>
+          <a:prstGeom prst="ellipse">
+            <a:avLst/>
+          </a:prstGeom>
+          <a:ln>
+            <a:noFill/>
+          </a:ln>
+        </p:spPr>
+        <p:style>
+          <a:lnRef idx="2">
+            <a:schemeClr val="accent1">
+              <a:shade val="50000"/>
+            </a:schemeClr>
+          </a:lnRef>
+          <a:fillRef idx="1">
+            <a:schemeClr val="accent1"/>
+          </a:fillRef>
+          <a:effectRef idx="0">
+            <a:schemeClr val="accent1"/>
+          </a:effectRef>
+          <a:fontRef idx="minor">
+            <a:schemeClr val="lt1"/>
+          </a:fontRef>
+        </p:style>
+        <p:txBody>
+          <a:bodyPr rtlCol="0" anchor="ctr"/>
+          <a:lstStyle/>
+          <a:p>
+            <a:pPr algn="ctr"/>
+            <a:endParaRPr lang="en-SG"/>
+          </a:p>
+        </p:txBody>
+      </p:sp>
+      <p:sp>
+        <p:nvSpPr>
+          <p:cNvPr id="78" name="Oval 77">
+            <a:extLst>
+              <a:ext uri="{FF2B5EF4-FFF2-40B4-BE49-F238E27FC236}">
+                <a16:creationId xmlns:a16="http://schemas.microsoft.com/office/drawing/2014/main" id="{8811081A-17C8-D83A-4149-B85B04B506E4}"/>
+              </a:ext>
+            </a:extLst>
+          </p:cNvPr>
+          <p:cNvSpPr/>
+          <p:nvPr/>
+        </p:nvSpPr>
+        <p:spPr>
+          <a:xfrm>
+            <a:off x="8397110" y="3656092"/>
+            <a:ext cx="81116" cy="116513"/>
+          </a:xfrm>
+          <a:prstGeom prst="ellipse">
+            <a:avLst/>
+          </a:prstGeom>
+          <a:ln>
+            <a:noFill/>
+          </a:ln>
+        </p:spPr>
+        <p:style>
+          <a:lnRef idx="2">
+            <a:schemeClr val="accent1">
+              <a:shade val="50000"/>
+            </a:schemeClr>
+          </a:lnRef>
+          <a:fillRef idx="1">
+            <a:schemeClr val="accent1"/>
+          </a:fillRef>
+          <a:effectRef idx="0">
+            <a:schemeClr val="accent1"/>
+          </a:effectRef>
+          <a:fontRef idx="minor">
+            <a:schemeClr val="lt1"/>
+          </a:fontRef>
+        </p:style>
+        <p:txBody>
+          <a:bodyPr rtlCol="0" anchor="ctr"/>
+          <a:lstStyle/>
+          <a:p>
+            <a:pPr algn="ctr"/>
+            <a:endParaRPr lang="en-SG"/>
+          </a:p>
+        </p:txBody>
+      </p:sp>
+      <p:sp>
+        <p:nvSpPr>
+          <p:cNvPr id="79" name="Oval 78">
+            <a:extLst>
+              <a:ext uri="{FF2B5EF4-FFF2-40B4-BE49-F238E27FC236}">
+                <a16:creationId xmlns:a16="http://schemas.microsoft.com/office/drawing/2014/main" id="{58FE2184-49AB-D4ED-6E30-AFE2B21BA96F}"/>
+              </a:ext>
+            </a:extLst>
+          </p:cNvPr>
+          <p:cNvSpPr/>
+          <p:nvPr/>
+        </p:nvSpPr>
+        <p:spPr>
+          <a:xfrm>
+            <a:off x="9226964" y="3654357"/>
+            <a:ext cx="81116" cy="116513"/>
+          </a:xfrm>
+          <a:prstGeom prst="ellipse">
+            <a:avLst/>
+          </a:prstGeom>
+          <a:ln>
+            <a:noFill/>
+          </a:ln>
+        </p:spPr>
+        <p:style>
+          <a:lnRef idx="2">
+            <a:schemeClr val="accent1">
+              <a:shade val="50000"/>
+            </a:schemeClr>
+          </a:lnRef>
+          <a:fillRef idx="1">
+            <a:schemeClr val="accent1"/>
+          </a:fillRef>
+          <a:effectRef idx="0">
+            <a:schemeClr val="accent1"/>
+          </a:effectRef>
+          <a:fontRef idx="minor">
+            <a:schemeClr val="lt1"/>
+          </a:fontRef>
+        </p:style>
+        <p:txBody>
+          <a:bodyPr rtlCol="0" anchor="ctr"/>
+          <a:lstStyle/>
+          <a:p>
+            <a:pPr algn="ctr"/>
+            <a:endParaRPr lang="en-SG"/>
+          </a:p>
+        </p:txBody>
+      </p:sp>
+      <p:sp>
+        <p:nvSpPr>
+          <p:cNvPr id="64" name="Oval 63">
+            <a:extLst>
+              <a:ext uri="{FF2B5EF4-FFF2-40B4-BE49-F238E27FC236}">
+                <a16:creationId xmlns:a16="http://schemas.microsoft.com/office/drawing/2014/main" id="{3FE8A99B-C724-D305-7E5F-4C8323F7B861}"/>
+              </a:ext>
+            </a:extLst>
+          </p:cNvPr>
+          <p:cNvSpPr/>
+          <p:nvPr/>
+        </p:nvSpPr>
+        <p:spPr>
+          <a:xfrm>
+            <a:off x="7579063" y="3661532"/>
+            <a:ext cx="81116" cy="116513"/>
+          </a:xfrm>
+          <a:prstGeom prst="ellipse">
+            <a:avLst/>
+          </a:prstGeom>
+          <a:ln>
+            <a:noFill/>
+          </a:ln>
+        </p:spPr>
+        <p:style>
+          <a:lnRef idx="2">
+            <a:schemeClr val="accent1">
+              <a:shade val="50000"/>
+            </a:schemeClr>
+          </a:lnRef>
+          <a:fillRef idx="1">
+            <a:schemeClr val="accent1"/>
+          </a:fillRef>
+          <a:effectRef idx="0">
+            <a:schemeClr val="accent1"/>
+          </a:effectRef>
+          <a:fontRef idx="minor">
+            <a:schemeClr val="lt1"/>
+          </a:fontRef>
+        </p:style>
+        <p:txBody>
+          <a:bodyPr rtlCol="0" anchor="ctr"/>
+          <a:lstStyle/>
+          <a:p>
+            <a:pPr algn="ctr"/>
+            <a:endParaRPr lang="en-SG"/>
+          </a:p>
+        </p:txBody>
+      </p:sp>
+    </p:spTree>
+    <p:extLst>
+      <p:ext uri="{BB962C8B-B14F-4D97-AF65-F5344CB8AC3E}">
+        <p14:creationId xmlns:p14="http://schemas.microsoft.com/office/powerpoint/2010/main" val="280788930"/>
       </p:ext>
     </p:extLst>
   </p:cSld>

</xml_diff>